<commit_message>
Android project planning done - todo related work
</commit_message>
<xml_diff>
--- a/FirstPresentation_Jan.pptx
+++ b/FirstPresentation_Jan.pptx
@@ -5,7 +5,7 @@
     <p:sldMasterId id="2147483648" r:id="rId1"/>
   </p:sldMasterIdLst>
   <p:notesMasterIdLst>
-    <p:notesMasterId r:id="rId14"/>
+    <p:notesMasterId r:id="rId12"/>
   </p:notesMasterIdLst>
   <p:sldIdLst>
     <p:sldId id="259" r:id="rId2"/>
@@ -13,13 +13,11 @@
     <p:sldId id="260" r:id="rId4"/>
     <p:sldId id="265" r:id="rId5"/>
     <p:sldId id="266" r:id="rId6"/>
-    <p:sldId id="261" r:id="rId7"/>
-    <p:sldId id="268" r:id="rId8"/>
-    <p:sldId id="269" r:id="rId9"/>
-    <p:sldId id="264" r:id="rId10"/>
-    <p:sldId id="267" r:id="rId11"/>
-    <p:sldId id="262" r:id="rId12"/>
-    <p:sldId id="263" r:id="rId13"/>
+    <p:sldId id="269" r:id="rId7"/>
+    <p:sldId id="264" r:id="rId8"/>
+    <p:sldId id="267" r:id="rId9"/>
+    <p:sldId id="262" r:id="rId10"/>
+    <p:sldId id="263" r:id="rId11"/>
   </p:sldIdLst>
   <p:sldSz cx="9144000" cy="5143500" type="screen16x9"/>
   <p:notesSz cx="6858000" cy="9144000"/>
@@ -233,7 +231,7 @@
           <a:p>
             <a:fld id="{3D100699-F170-47EF-8601-8ACFF448602A}" type="datetimeFigureOut">
               <a:rPr lang="de-DE" smtClean="0"/>
-              <a:t>04.11.2018</a:t>
+              <a:t>05.11.2018</a:t>
             </a:fld>
             <a:endParaRPr lang="de-DE"/>
           </a:p>
@@ -973,7 +971,140 @@
           <a:bodyPr/>
           <a:lstStyle/>
           <a:p>
-            <a:endParaRPr lang="de-DE"/>
+            <a:r>
+              <a:rPr lang="de-DE" dirty="0" err="1"/>
+              <a:t>Randomized</a:t>
+            </a:r>
+            <a:r>
+              <a:rPr lang="de-DE" dirty="0"/>
+              <a:t> </a:t>
+            </a:r>
+            <a:r>
+              <a:rPr lang="de-DE" dirty="0" err="1"/>
+              <a:t>targets</a:t>
+            </a:r>
+            <a:endParaRPr lang="de-DE" dirty="0"/>
+          </a:p>
+          <a:p>
+            <a:r>
+              <a:rPr lang="de-DE" dirty="0"/>
+              <a:t>50 % Finger, 50 % </a:t>
+            </a:r>
+            <a:r>
+              <a:rPr lang="de-DE" dirty="0" err="1"/>
+              <a:t>Knuckle</a:t>
+            </a:r>
+            <a:endParaRPr lang="de-DE" dirty="0"/>
+          </a:p>
+          <a:p>
+            <a:r>
+              <a:rPr lang="de-DE" dirty="0"/>
+              <a:t>3 different input-</a:t>
+            </a:r>
+            <a:r>
+              <a:rPr lang="de-DE" dirty="0" err="1"/>
+              <a:t>methods</a:t>
+            </a:r>
+            <a:r>
+              <a:rPr lang="de-DE" dirty="0"/>
+              <a:t>:</a:t>
+            </a:r>
+          </a:p>
+          <a:p>
+            <a:pPr lvl="1"/>
+            <a:r>
+              <a:rPr lang="de-DE" dirty="0" err="1"/>
+              <a:t>Tap</a:t>
+            </a:r>
+            <a:endParaRPr lang="de-DE" dirty="0"/>
+          </a:p>
+          <a:p>
+            <a:pPr lvl="1"/>
+            <a:r>
+              <a:rPr lang="de-DE" dirty="0"/>
+              <a:t>Double-</a:t>
+            </a:r>
+            <a:r>
+              <a:rPr lang="de-DE" dirty="0" err="1"/>
+              <a:t>Tap</a:t>
+            </a:r>
+            <a:endParaRPr lang="de-DE" dirty="0"/>
+          </a:p>
+          <a:p>
+            <a:pPr lvl="1"/>
+            <a:r>
+              <a:rPr lang="de-DE" dirty="0"/>
+              <a:t>Long-Press</a:t>
+            </a:r>
+          </a:p>
+          <a:p>
+            <a:r>
+              <a:rPr lang="de-DE" dirty="0" err="1"/>
+              <a:t>Collected</a:t>
+            </a:r>
+            <a:r>
+              <a:rPr lang="de-DE" dirty="0"/>
+              <a:t> </a:t>
+            </a:r>
+            <a:r>
+              <a:rPr lang="de-DE" dirty="0" err="1"/>
+              <a:t>data</a:t>
+            </a:r>
+            <a:r>
+              <a:rPr lang="de-DE" dirty="0"/>
+              <a:t>: </a:t>
+            </a:r>
+            <a:r>
+              <a:rPr lang="de-DE" dirty="0" err="1"/>
+              <a:t>Capacitive</a:t>
+            </a:r>
+            <a:r>
+              <a:rPr lang="de-DE" dirty="0"/>
+              <a:t> </a:t>
+            </a:r>
+            <a:r>
+              <a:rPr lang="de-DE" dirty="0" err="1"/>
+              <a:t>image</a:t>
+            </a:r>
+            <a:r>
+              <a:rPr lang="de-DE" dirty="0"/>
+              <a:t>, </a:t>
+            </a:r>
+            <a:r>
+              <a:rPr lang="de-DE" dirty="0" err="1"/>
+              <a:t>UserID</a:t>
+            </a:r>
+            <a:r>
+              <a:rPr lang="de-DE" dirty="0"/>
+              <a:t>, </a:t>
+            </a:r>
+            <a:r>
+              <a:rPr lang="de-DE" dirty="0" err="1"/>
+              <a:t>Condition</a:t>
+            </a:r>
+            <a:r>
+              <a:rPr lang="de-DE" dirty="0"/>
+              <a:t>, UNIX-</a:t>
+            </a:r>
+            <a:r>
+              <a:rPr lang="de-DE" dirty="0" err="1"/>
+              <a:t>Timestamp</a:t>
+            </a:r>
+            <a:r>
+              <a:rPr lang="de-DE" dirty="0"/>
+              <a:t>, </a:t>
+            </a:r>
+            <a:r>
+              <a:rPr lang="de-DE" dirty="0" err="1"/>
+              <a:t>TargetID</a:t>
+            </a:r>
+            <a:r>
+              <a:rPr lang="de-DE" dirty="0"/>
+              <a:t>, Position</a:t>
+            </a:r>
+          </a:p>
+          <a:p>
+            <a:endParaRPr lang="de-DE" dirty="0"/>
           </a:p>
         </p:txBody>
       </p:sp>
@@ -994,7 +1125,7 @@
           <a:p>
             <a:fld id="{6F4F2A7C-E896-4C15-99D8-2B5BC94A4F36}" type="slidenum">
               <a:rPr lang="de-DE" smtClean="0"/>
-              <a:t>7</a:t>
+              <a:t>6</a:t>
             </a:fld>
             <a:endParaRPr lang="de-DE"/>
           </a:p>
@@ -1003,7 +1134,7 @@
     </p:spTree>
     <p:extLst>
       <p:ext uri="{BB962C8B-B14F-4D97-AF65-F5344CB8AC3E}">
-        <p14:creationId xmlns:p14="http://schemas.microsoft.com/office/powerpoint/2010/main" val="2338302986"/>
+        <p14:creationId xmlns:p14="http://schemas.microsoft.com/office/powerpoint/2010/main" val="2091234758"/>
       </p:ext>
     </p:extLst>
   </p:cSld>
@@ -3188,388 +3319,6 @@
           <p:cNvPr id="2" name="Inhaltsplatzhalter 1">
             <a:extLst>
               <a:ext uri="{FF2B5EF4-FFF2-40B4-BE49-F238E27FC236}">
-                <a16:creationId xmlns:a16="http://schemas.microsoft.com/office/drawing/2014/main" id="{3E4A7660-D434-4625-A150-900328F4507B}"/>
-              </a:ext>
-            </a:extLst>
-          </p:cNvPr>
-          <p:cNvSpPr>
-            <a:spLocks noGrp="1"/>
-          </p:cNvSpPr>
-          <p:nvPr>
-            <p:ph idx="1"/>
-          </p:nvPr>
-        </p:nvSpPr>
-        <p:spPr/>
-        <p:txBody>
-          <a:bodyPr/>
-          <a:lstStyle/>
-          <a:p>
-            <a:r>
-              <a:rPr lang="de-DE" dirty="0"/>
-              <a:t>1 CNN </a:t>
-            </a:r>
-            <a:r>
-              <a:rPr lang="de-DE" dirty="0" err="1"/>
-              <a:t>for</a:t>
-            </a:r>
-            <a:r>
-              <a:rPr lang="de-DE" dirty="0"/>
-              <a:t> all </a:t>
-            </a:r>
-            <a:r>
-              <a:rPr lang="de-DE" dirty="0" err="1"/>
-              <a:t>data</a:t>
-            </a:r>
-            <a:endParaRPr lang="de-DE" dirty="0"/>
-          </a:p>
-          <a:p>
-            <a:endParaRPr lang="de-DE" dirty="0"/>
-          </a:p>
-          <a:p>
-            <a:endParaRPr lang="de-DE" dirty="0"/>
-          </a:p>
-        </p:txBody>
-      </p:sp>
-      <p:sp>
-        <p:nvSpPr>
-          <p:cNvPr id="3" name="Foliennummernplatzhalter 2">
-            <a:extLst>
-              <a:ext uri="{FF2B5EF4-FFF2-40B4-BE49-F238E27FC236}">
-                <a16:creationId xmlns:a16="http://schemas.microsoft.com/office/drawing/2014/main" id="{11672526-37FB-4CD3-A3FE-A70E0C29DEBB}"/>
-              </a:ext>
-            </a:extLst>
-          </p:cNvPr>
-          <p:cNvSpPr>
-            <a:spLocks noGrp="1"/>
-          </p:cNvSpPr>
-          <p:nvPr>
-            <p:ph type="sldNum" sz="quarter" idx="12"/>
-          </p:nvPr>
-        </p:nvSpPr>
-        <p:spPr/>
-        <p:txBody>
-          <a:bodyPr/>
-          <a:lstStyle/>
-          <a:p>
-            <a:fld id="{29AD3987-26BA-49DC-BA24-72731371DC9F}" type="slidenum">
-              <a:rPr lang="de-DE" smtClean="0"/>
-              <a:t>10</a:t>
-            </a:fld>
-            <a:endParaRPr lang="de-DE" dirty="0"/>
-          </a:p>
-        </p:txBody>
-      </p:sp>
-      <p:sp>
-        <p:nvSpPr>
-          <p:cNvPr id="4" name="Titel 3">
-            <a:extLst>
-              <a:ext uri="{FF2B5EF4-FFF2-40B4-BE49-F238E27FC236}">
-                <a16:creationId xmlns:a16="http://schemas.microsoft.com/office/drawing/2014/main" id="{CDF3721F-581E-4D0C-87D6-6590FCD81F7C}"/>
-              </a:ext>
-            </a:extLst>
-          </p:cNvPr>
-          <p:cNvSpPr>
-            <a:spLocks noGrp="1"/>
-          </p:cNvSpPr>
-          <p:nvPr>
-            <p:ph type="title"/>
-          </p:nvPr>
-        </p:nvSpPr>
-        <p:spPr/>
-        <p:txBody>
-          <a:bodyPr/>
-          <a:lstStyle/>
-          <a:p>
-            <a:r>
-              <a:rPr lang="de-DE" dirty="0"/>
-              <a:t>Project </a:t>
-            </a:r>
-            <a:r>
-              <a:rPr lang="de-DE" dirty="0" err="1"/>
-              <a:t>planning</a:t>
-            </a:r>
-            <a:r>
-              <a:rPr lang="de-DE" dirty="0"/>
-              <a:t>: Model </a:t>
-            </a:r>
-            <a:r>
-              <a:rPr lang="de-DE" dirty="0" err="1"/>
-              <a:t>training</a:t>
-            </a:r>
-            <a:endParaRPr lang="de-DE" dirty="0"/>
-          </a:p>
-        </p:txBody>
-      </p:sp>
-    </p:spTree>
-    <p:extLst>
-      <p:ext uri="{BB962C8B-B14F-4D97-AF65-F5344CB8AC3E}">
-        <p14:creationId xmlns:p14="http://schemas.microsoft.com/office/powerpoint/2010/main" val="1517286234"/>
-      </p:ext>
-    </p:extLst>
-  </p:cSld>
-  <p:clrMapOvr>
-    <a:masterClrMapping/>
-  </p:clrMapOvr>
-</p:sld>
-</file>
-
-<file path=ppt/slides/slide11.xml><?xml version="1.0" encoding="utf-8"?>
-<p:sld xmlns:a="http://schemas.openxmlformats.org/drawingml/2006/main" xmlns:r="http://schemas.openxmlformats.org/officeDocument/2006/relationships" xmlns:p="http://schemas.openxmlformats.org/presentationml/2006/main">
-  <p:cSld>
-    <p:spTree>
-      <p:nvGrpSpPr>
-        <p:cNvPr id="1" name=""/>
-        <p:cNvGrpSpPr/>
-        <p:nvPr/>
-      </p:nvGrpSpPr>
-      <p:grpSpPr>
-        <a:xfrm>
-          <a:off x="0" y="0"/>
-          <a:ext cx="0" cy="0"/>
-          <a:chOff x="0" y="0"/>
-          <a:chExt cx="0" cy="0"/>
-        </a:xfrm>
-      </p:grpSpPr>
-      <p:sp>
-        <p:nvSpPr>
-          <p:cNvPr id="2" name="Inhaltsplatzhalter 1">
-            <a:extLst>
-              <a:ext uri="{FF2B5EF4-FFF2-40B4-BE49-F238E27FC236}">
-                <a16:creationId xmlns:a16="http://schemas.microsoft.com/office/drawing/2014/main" id="{719F1C91-4689-4DC8-AD81-6F1E4DCC533C}"/>
-              </a:ext>
-            </a:extLst>
-          </p:cNvPr>
-          <p:cNvSpPr>
-            <a:spLocks noGrp="1"/>
-          </p:cNvSpPr>
-          <p:nvPr>
-            <p:ph idx="1"/>
-          </p:nvPr>
-        </p:nvSpPr>
-        <p:spPr/>
-        <p:txBody>
-          <a:bodyPr/>
-          <a:lstStyle/>
-          <a:p>
-            <a:r>
-              <a:rPr lang="de-DE" dirty="0"/>
-              <a:t>App </a:t>
-            </a:r>
-            <a:r>
-              <a:rPr lang="de-DE" dirty="0" err="1"/>
-              <a:t>until</a:t>
-            </a:r>
-            <a:r>
-              <a:rPr lang="de-DE" dirty="0"/>
-              <a:t> 9.12</a:t>
-            </a:r>
-          </a:p>
-          <a:p>
-            <a:r>
-              <a:rPr lang="de-DE" dirty="0"/>
-              <a:t>Study </a:t>
-            </a:r>
-            <a:r>
-              <a:rPr lang="de-DE" dirty="0" err="1"/>
-              <a:t>done</a:t>
-            </a:r>
-            <a:r>
-              <a:rPr lang="de-DE" dirty="0"/>
-              <a:t> </a:t>
-            </a:r>
-            <a:r>
-              <a:rPr lang="de-DE" dirty="0" err="1"/>
-              <a:t>until</a:t>
-            </a:r>
-            <a:r>
-              <a:rPr lang="de-DE" dirty="0"/>
-              <a:t> 21.12</a:t>
-            </a:r>
-          </a:p>
-          <a:p>
-            <a:r>
-              <a:rPr lang="de-DE" dirty="0" err="1"/>
-              <a:t>Results</a:t>
-            </a:r>
-            <a:r>
-              <a:rPr lang="de-DE" dirty="0"/>
-              <a:t> </a:t>
-            </a:r>
-            <a:r>
-              <a:rPr lang="de-DE" dirty="0" err="1"/>
-              <a:t>until</a:t>
-            </a:r>
-            <a:r>
-              <a:rPr lang="de-DE" dirty="0"/>
-              <a:t> end </a:t>
-            </a:r>
-            <a:r>
-              <a:rPr lang="de-DE" dirty="0" err="1"/>
-              <a:t>of</a:t>
-            </a:r>
-            <a:r>
-              <a:rPr lang="de-DE" dirty="0"/>
-              <a:t> </a:t>
-            </a:r>
-            <a:r>
-              <a:rPr lang="de-DE" dirty="0" err="1"/>
-              <a:t>january</a:t>
-            </a:r>
-            <a:endParaRPr lang="de-DE" dirty="0"/>
-          </a:p>
-          <a:p>
-            <a:r>
-              <a:rPr lang="de-DE" dirty="0" err="1"/>
-              <a:t>Camera</a:t>
-            </a:r>
-            <a:r>
-              <a:rPr lang="de-DE" dirty="0"/>
-              <a:t> </a:t>
-            </a:r>
-            <a:r>
-              <a:rPr lang="de-DE" dirty="0" err="1"/>
-              <a:t>ready</a:t>
-            </a:r>
-            <a:r>
-              <a:rPr lang="de-DE" dirty="0"/>
-              <a:t> </a:t>
-            </a:r>
-            <a:r>
-              <a:rPr lang="de-DE" dirty="0" err="1"/>
-              <a:t>paper</a:t>
-            </a:r>
-            <a:r>
-              <a:rPr lang="de-DE" dirty="0"/>
-              <a:t> </a:t>
-            </a:r>
-            <a:r>
-              <a:rPr lang="de-DE" dirty="0" err="1"/>
-              <a:t>until</a:t>
-            </a:r>
-            <a:r>
-              <a:rPr lang="de-DE" dirty="0"/>
-              <a:t> </a:t>
-            </a:r>
-            <a:r>
-              <a:rPr lang="de-DE" dirty="0" err="1"/>
-              <a:t>mid</a:t>
-            </a:r>
-            <a:r>
-              <a:rPr lang="de-DE" dirty="0"/>
-              <a:t> </a:t>
-            </a:r>
-            <a:r>
-              <a:rPr lang="de-DE" dirty="0" err="1"/>
-              <a:t>february</a:t>
-            </a:r>
-            <a:endParaRPr lang="de-DE" dirty="0"/>
-          </a:p>
-          <a:p>
-            <a:endParaRPr lang="de-DE" dirty="0"/>
-          </a:p>
-          <a:p>
-            <a:endParaRPr lang="de-DE" dirty="0"/>
-          </a:p>
-          <a:p>
-            <a:endParaRPr lang="de-DE" dirty="0"/>
-          </a:p>
-          <a:p>
-            <a:endParaRPr lang="de-DE" dirty="0"/>
-          </a:p>
-        </p:txBody>
-      </p:sp>
-      <p:sp>
-        <p:nvSpPr>
-          <p:cNvPr id="3" name="Foliennummernplatzhalter 2">
-            <a:extLst>
-              <a:ext uri="{FF2B5EF4-FFF2-40B4-BE49-F238E27FC236}">
-                <a16:creationId xmlns:a16="http://schemas.microsoft.com/office/drawing/2014/main" id="{59C2DE10-8D0E-4834-9FE4-C5D704BF65DA}"/>
-              </a:ext>
-            </a:extLst>
-          </p:cNvPr>
-          <p:cNvSpPr>
-            <a:spLocks noGrp="1"/>
-          </p:cNvSpPr>
-          <p:nvPr>
-            <p:ph type="sldNum" sz="quarter" idx="12"/>
-          </p:nvPr>
-        </p:nvSpPr>
-        <p:spPr/>
-        <p:txBody>
-          <a:bodyPr/>
-          <a:lstStyle/>
-          <a:p>
-            <a:fld id="{29AD3987-26BA-49DC-BA24-72731371DC9F}" type="slidenum">
-              <a:rPr lang="de-DE" smtClean="0"/>
-              <a:t>11</a:t>
-            </a:fld>
-            <a:endParaRPr lang="de-DE" dirty="0"/>
-          </a:p>
-        </p:txBody>
-      </p:sp>
-      <p:sp>
-        <p:nvSpPr>
-          <p:cNvPr id="4" name="Titel 3">
-            <a:extLst>
-              <a:ext uri="{FF2B5EF4-FFF2-40B4-BE49-F238E27FC236}">
-                <a16:creationId xmlns:a16="http://schemas.microsoft.com/office/drawing/2014/main" id="{52E21FE3-62D2-416F-A8C1-4F273C3B927C}"/>
-              </a:ext>
-            </a:extLst>
-          </p:cNvPr>
-          <p:cNvSpPr>
-            <a:spLocks noGrp="1"/>
-          </p:cNvSpPr>
-          <p:nvPr>
-            <p:ph type="title"/>
-          </p:nvPr>
-        </p:nvSpPr>
-        <p:spPr/>
-        <p:txBody>
-          <a:bodyPr/>
-          <a:lstStyle/>
-          <a:p>
-            <a:r>
-              <a:rPr lang="de-DE" dirty="0"/>
-              <a:t>Agenda</a:t>
-            </a:r>
-          </a:p>
-        </p:txBody>
-      </p:sp>
-    </p:spTree>
-    <p:extLst>
-      <p:ext uri="{BB962C8B-B14F-4D97-AF65-F5344CB8AC3E}">
-        <p14:creationId xmlns:p14="http://schemas.microsoft.com/office/powerpoint/2010/main" val="1059873877"/>
-      </p:ext>
-    </p:extLst>
-  </p:cSld>
-  <p:clrMapOvr>
-    <a:masterClrMapping/>
-  </p:clrMapOvr>
-</p:sld>
-</file>
-
-<file path=ppt/slides/slide12.xml><?xml version="1.0" encoding="utf-8"?>
-<p:sld xmlns:a="http://schemas.openxmlformats.org/drawingml/2006/main" xmlns:r="http://schemas.openxmlformats.org/officeDocument/2006/relationships" xmlns:p="http://schemas.openxmlformats.org/presentationml/2006/main">
-  <p:cSld>
-    <p:spTree>
-      <p:nvGrpSpPr>
-        <p:cNvPr id="1" name=""/>
-        <p:cNvGrpSpPr/>
-        <p:nvPr/>
-      </p:nvGrpSpPr>
-      <p:grpSpPr>
-        <a:xfrm>
-          <a:off x="0" y="0"/>
-          <a:ext cx="0" cy="0"/>
-          <a:chOff x="0" y="0"/>
-          <a:chExt cx="0" cy="0"/>
-        </a:xfrm>
-      </p:grpSpPr>
-      <p:sp>
-        <p:nvSpPr>
-          <p:cNvPr id="2" name="Inhaltsplatzhalter 1">
-            <a:extLst>
-              <a:ext uri="{FF2B5EF4-FFF2-40B4-BE49-F238E27FC236}">
                 <a16:creationId xmlns:a16="http://schemas.microsoft.com/office/drawing/2014/main" id="{8C5756BE-CC62-409B-BBD1-CE8FA0679942}"/>
               </a:ext>
             </a:extLst>
@@ -3714,7 +3463,7 @@
           <a:p>
             <a:fld id="{29AD3987-26BA-49DC-BA24-72731371DC9F}" type="slidenum">
               <a:rPr lang="de-DE" smtClean="0"/>
-              <a:t>12</a:t>
+              <a:t>10</a:t>
             </a:fld>
             <a:endParaRPr lang="de-DE" dirty="0"/>
           </a:p>
@@ -4307,7 +4056,7 @@
           <p:cNvPr id="2" name="Inhaltsplatzhalter 1">
             <a:extLst>
               <a:ext uri="{FF2B5EF4-FFF2-40B4-BE49-F238E27FC236}">
-                <a16:creationId xmlns:a16="http://schemas.microsoft.com/office/drawing/2014/main" id="{956ED5D2-8E5F-4E90-BE26-91113C7F6158}"/>
+                <a16:creationId xmlns:a16="http://schemas.microsoft.com/office/drawing/2014/main" id="{88500AB4-5597-4578-9B71-BF9A3A0B0B3D}"/>
               </a:ext>
             </a:extLst>
           </p:cNvPr>
@@ -4318,141 +4067,95 @@
             <p:ph idx="1"/>
           </p:nvPr>
         </p:nvSpPr>
-        <p:spPr/>
+        <p:spPr>
+          <a:xfrm>
+            <a:off x="251519" y="1202574"/>
+            <a:ext cx="3299637" cy="3400026"/>
+          </a:xfrm>
+        </p:spPr>
         <p:txBody>
           <a:bodyPr/>
           <a:lstStyle/>
           <a:p>
             <a:r>
+              <a:rPr lang="de-DE" dirty="0"/>
+              <a:t>Input </a:t>
+            </a:r>
+            <a:r>
+              <a:rPr lang="de-DE" dirty="0" err="1"/>
+              <a:t>method</a:t>
+            </a:r>
+            <a:r>
+              <a:rPr lang="de-DE" dirty="0"/>
+              <a:t> </a:t>
+            </a:r>
+          </a:p>
+          <a:p>
+            <a:pPr lvl="1"/>
+            <a:r>
+              <a:rPr lang="de-DE" dirty="0"/>
+              <a:t>Finger	</a:t>
+            </a:r>
+          </a:p>
+          <a:p>
+            <a:pPr lvl="1"/>
+            <a:r>
+              <a:rPr lang="de-DE" dirty="0" err="1"/>
+              <a:t>Knuckle</a:t>
+            </a:r>
+            <a:r>
+              <a:rPr lang="de-DE" dirty="0"/>
+              <a:t>	</a:t>
+            </a:r>
+          </a:p>
+          <a:p>
+            <a:r>
+              <a:rPr lang="de-DE" dirty="0" err="1"/>
+              <a:t>Tap</a:t>
+            </a:r>
+            <a:r>
+              <a:rPr lang="de-DE" dirty="0"/>
+              <a:t> Type </a:t>
+            </a:r>
+          </a:p>
+          <a:p>
+            <a:pPr lvl="1"/>
+            <a:r>
+              <a:rPr lang="de-DE" dirty="0" err="1"/>
+              <a:t>Tap</a:t>
+            </a:r>
+            <a:r>
+              <a:rPr lang="de-DE" dirty="0"/>
+              <a:t>	</a:t>
+            </a:r>
+          </a:p>
+          <a:p>
+            <a:pPr lvl="1"/>
+            <a:r>
+              <a:rPr lang="de-DE" dirty="0"/>
+              <a:t>Double-</a:t>
+            </a:r>
+            <a:r>
+              <a:rPr lang="de-DE" dirty="0" err="1"/>
+              <a:t>Tap</a:t>
+            </a:r>
+            <a:endParaRPr lang="de-DE" dirty="0"/>
+          </a:p>
+          <a:p>
+            <a:pPr lvl="1"/>
+            <a:r>
+              <a:rPr lang="de-DE" dirty="0"/>
+              <a:t>Long-Press</a:t>
+            </a:r>
+          </a:p>
+          <a:p>
+            <a:r>
               <a:rPr lang="de-DE" dirty="0" err="1"/>
               <a:t>Randomized</a:t>
             </a:r>
             <a:r>
               <a:rPr lang="de-DE" dirty="0"/>
-              <a:t> </a:t>
-            </a:r>
-            <a:r>
-              <a:rPr lang="de-DE" dirty="0" err="1"/>
-              <a:t>targets</a:t>
-            </a:r>
-            <a:endParaRPr lang="de-DE" dirty="0"/>
-          </a:p>
-          <a:p>
-            <a:r>
-              <a:rPr lang="de-DE" dirty="0"/>
-              <a:t>50 % Finger, 50 % </a:t>
-            </a:r>
-            <a:r>
-              <a:rPr lang="de-DE" dirty="0" err="1"/>
-              <a:t>Knuckle</a:t>
-            </a:r>
-            <a:endParaRPr lang="de-DE" dirty="0"/>
-          </a:p>
-          <a:p>
-            <a:r>
-              <a:rPr lang="de-DE" dirty="0"/>
-              <a:t>3 different input-</a:t>
-            </a:r>
-            <a:r>
-              <a:rPr lang="de-DE" dirty="0" err="1"/>
-              <a:t>methods</a:t>
-            </a:r>
-            <a:r>
-              <a:rPr lang="de-DE" dirty="0"/>
-              <a:t>:</a:t>
-            </a:r>
-          </a:p>
-          <a:p>
-            <a:pPr lvl="1"/>
-            <a:r>
-              <a:rPr lang="de-DE" dirty="0" err="1"/>
-              <a:t>Tap</a:t>
-            </a:r>
-            <a:endParaRPr lang="de-DE" dirty="0"/>
-          </a:p>
-          <a:p>
-            <a:pPr lvl="1"/>
-            <a:r>
-              <a:rPr lang="de-DE" dirty="0"/>
-              <a:t>Double-</a:t>
-            </a:r>
-            <a:r>
-              <a:rPr lang="de-DE" dirty="0" err="1"/>
-              <a:t>Tap</a:t>
-            </a:r>
-            <a:endParaRPr lang="de-DE" dirty="0"/>
-          </a:p>
-          <a:p>
-            <a:pPr lvl="1"/>
-            <a:r>
-              <a:rPr lang="de-DE" dirty="0"/>
-              <a:t>Long-Press</a:t>
-            </a:r>
-          </a:p>
-          <a:p>
-            <a:r>
-              <a:rPr lang="de-DE" dirty="0" err="1"/>
-              <a:t>Collected</a:t>
-            </a:r>
-            <a:r>
-              <a:rPr lang="de-DE" dirty="0"/>
-              <a:t> </a:t>
-            </a:r>
-            <a:r>
-              <a:rPr lang="de-DE" dirty="0" err="1"/>
-              <a:t>data</a:t>
-            </a:r>
-            <a:r>
-              <a:rPr lang="de-DE" dirty="0"/>
-              <a:t>: </a:t>
-            </a:r>
-            <a:r>
-              <a:rPr lang="de-DE" dirty="0" err="1"/>
-              <a:t>Capacitive</a:t>
-            </a:r>
-            <a:r>
-              <a:rPr lang="de-DE" dirty="0"/>
-              <a:t> </a:t>
-            </a:r>
-            <a:r>
-              <a:rPr lang="de-DE" dirty="0" err="1"/>
-              <a:t>image</a:t>
-            </a:r>
-            <a:r>
-              <a:rPr lang="de-DE" dirty="0"/>
-              <a:t>, </a:t>
-            </a:r>
-            <a:r>
-              <a:rPr lang="de-DE" dirty="0" err="1"/>
-              <a:t>UserID</a:t>
-            </a:r>
-            <a:r>
-              <a:rPr lang="de-DE" dirty="0"/>
-              <a:t>, </a:t>
-            </a:r>
-            <a:r>
-              <a:rPr lang="de-DE" dirty="0" err="1"/>
-              <a:t>Condition</a:t>
-            </a:r>
-            <a:r>
-              <a:rPr lang="de-DE" dirty="0"/>
-              <a:t>, UNIX-</a:t>
-            </a:r>
-            <a:r>
-              <a:rPr lang="de-DE" dirty="0" err="1"/>
-              <a:t>Timestamp</a:t>
-            </a:r>
-            <a:r>
-              <a:rPr lang="de-DE" dirty="0"/>
-              <a:t>, </a:t>
-            </a:r>
-            <a:r>
-              <a:rPr lang="de-DE" dirty="0" err="1"/>
-              <a:t>TargetID</a:t>
-            </a:r>
-            <a:r>
-              <a:rPr lang="de-DE" dirty="0"/>
-              <a:t>, Position</a:t>
+              <a:t> Targets</a:t>
             </a:r>
           </a:p>
           <a:p>
@@ -4465,7 +4168,7 @@
           <p:cNvPr id="3" name="Foliennummernplatzhalter 2">
             <a:extLst>
               <a:ext uri="{FF2B5EF4-FFF2-40B4-BE49-F238E27FC236}">
-                <a16:creationId xmlns:a16="http://schemas.microsoft.com/office/drawing/2014/main" id="{C8D48D11-524B-45E1-B0B7-8E02E165924C}"/>
+                <a16:creationId xmlns:a16="http://schemas.microsoft.com/office/drawing/2014/main" id="{FB313AD9-7B68-43BF-98FF-33E13BBA00EF}"/>
               </a:ext>
             </a:extLst>
           </p:cNvPr>
@@ -4494,7 +4197,7 @@
           <p:cNvPr id="4" name="Titel 3">
             <a:extLst>
               <a:ext uri="{FF2B5EF4-FFF2-40B4-BE49-F238E27FC236}">
-                <a16:creationId xmlns:a16="http://schemas.microsoft.com/office/drawing/2014/main" id="{E20FA407-7642-4D4E-AD07-845ADFA86DEE}"/>
+                <a16:creationId xmlns:a16="http://schemas.microsoft.com/office/drawing/2014/main" id="{50E097EA-1F25-4894-A7D9-C82CDC128444}"/>
               </a:ext>
             </a:extLst>
           </p:cNvPr>
@@ -4525,608 +4228,12 @@
           </a:p>
         </p:txBody>
       </p:sp>
-    </p:spTree>
-    <p:extLst>
-      <p:ext uri="{BB962C8B-B14F-4D97-AF65-F5344CB8AC3E}">
-        <p14:creationId xmlns:p14="http://schemas.microsoft.com/office/powerpoint/2010/main" val="442796118"/>
-      </p:ext>
-    </p:extLst>
-  </p:cSld>
-  <p:clrMapOvr>
-    <a:masterClrMapping/>
-  </p:clrMapOvr>
-</p:sld>
-</file>
-
-<file path=ppt/slides/slide7.xml><?xml version="1.0" encoding="utf-8"?>
-<p:sld xmlns:a="http://schemas.openxmlformats.org/drawingml/2006/main" xmlns:r="http://schemas.openxmlformats.org/officeDocument/2006/relationships" xmlns:p="http://schemas.openxmlformats.org/presentationml/2006/main">
-  <p:cSld>
-    <p:spTree>
-      <p:nvGrpSpPr>
-        <p:cNvPr id="1" name=""/>
-        <p:cNvGrpSpPr/>
-        <p:nvPr/>
-      </p:nvGrpSpPr>
-      <p:grpSpPr>
-        <a:xfrm>
-          <a:off x="0" y="0"/>
-          <a:ext cx="0" cy="0"/>
-          <a:chOff x="0" y="0"/>
-          <a:chExt cx="0" cy="0"/>
-        </a:xfrm>
-      </p:grpSpPr>
-      <p:sp>
-        <p:nvSpPr>
-          <p:cNvPr id="3" name="Foliennummernplatzhalter 2">
+      <p:pic>
+        <p:nvPicPr>
+          <p:cNvPr id="6" name="Grafik 5">
             <a:extLst>
               <a:ext uri="{FF2B5EF4-FFF2-40B4-BE49-F238E27FC236}">
-                <a16:creationId xmlns:a16="http://schemas.microsoft.com/office/drawing/2014/main" id="{C8D48D11-524B-45E1-B0B7-8E02E165924C}"/>
-              </a:ext>
-            </a:extLst>
-          </p:cNvPr>
-          <p:cNvSpPr>
-            <a:spLocks noGrp="1"/>
-          </p:cNvSpPr>
-          <p:nvPr>
-            <p:ph type="sldNum" sz="quarter" idx="12"/>
-          </p:nvPr>
-        </p:nvSpPr>
-        <p:spPr/>
-        <p:txBody>
-          <a:bodyPr/>
-          <a:lstStyle/>
-          <a:p>
-            <a:fld id="{29AD3987-26BA-49DC-BA24-72731371DC9F}" type="slidenum">
-              <a:rPr lang="de-DE" smtClean="0"/>
-              <a:t>7</a:t>
-            </a:fld>
-            <a:endParaRPr lang="de-DE" dirty="0"/>
-          </a:p>
-        </p:txBody>
-      </p:sp>
-      <p:sp>
-        <p:nvSpPr>
-          <p:cNvPr id="4" name="Titel 3">
-            <a:extLst>
-              <a:ext uri="{FF2B5EF4-FFF2-40B4-BE49-F238E27FC236}">
-                <a16:creationId xmlns:a16="http://schemas.microsoft.com/office/drawing/2014/main" id="{E20FA407-7642-4D4E-AD07-845ADFA86DEE}"/>
-              </a:ext>
-            </a:extLst>
-          </p:cNvPr>
-          <p:cNvSpPr>
-            <a:spLocks noGrp="1"/>
-          </p:cNvSpPr>
-          <p:nvPr>
-            <p:ph type="title"/>
-          </p:nvPr>
-        </p:nvSpPr>
-        <p:spPr>
-          <a:xfrm>
-            <a:off x="815113" y="-155459"/>
-            <a:ext cx="8641006" cy="820625"/>
-          </a:xfrm>
-        </p:spPr>
-        <p:txBody>
-          <a:bodyPr/>
-          <a:lstStyle/>
-          <a:p>
-            <a:r>
-              <a:rPr lang="de-DE" dirty="0"/>
-              <a:t>Project </a:t>
-            </a:r>
-            <a:r>
-              <a:rPr lang="de-DE" dirty="0" err="1"/>
-              <a:t>planning</a:t>
-            </a:r>
-            <a:r>
-              <a:rPr lang="de-DE" dirty="0"/>
-              <a:t>: Android-App</a:t>
-            </a:r>
-          </a:p>
-        </p:txBody>
-      </p:sp>
-      <p:graphicFrame>
-        <p:nvGraphicFramePr>
-          <p:cNvPr id="17" name="Tabelle 16">
-            <a:extLst>
-              <a:ext uri="{FF2B5EF4-FFF2-40B4-BE49-F238E27FC236}">
-                <a16:creationId xmlns:a16="http://schemas.microsoft.com/office/drawing/2014/main" id="{E4B10438-8217-4CFA-8D32-1E54A98E7A4E}"/>
-              </a:ext>
-            </a:extLst>
-          </p:cNvPr>
-          <p:cNvGraphicFramePr>
-            <a:graphicFrameLocks noGrp="1"/>
-          </p:cNvGraphicFramePr>
-          <p:nvPr>
-            <p:extLst>
-              <p:ext uri="{D42A27DB-BD31-4B8C-83A1-F6EECF244321}">
-                <p14:modId xmlns:p14="http://schemas.microsoft.com/office/powerpoint/2010/main" val="2271271565"/>
-              </p:ext>
-            </p:extLst>
-          </p:nvPr>
-        </p:nvGraphicFramePr>
-        <p:xfrm>
-          <a:off x="6404240" y="930493"/>
-          <a:ext cx="2056192" cy="3820929"/>
-        </p:xfrm>
-        <a:graphic>
-          <a:graphicData uri="http://schemas.openxmlformats.org/drawingml/2006/table">
-            <a:tbl>
-              <a:tblPr firstRow="1" bandRow="1">
-                <a:tableStyleId>{6E25E649-3F16-4E02-A733-19D2CDBF48F0}</a:tableStyleId>
-              </a:tblPr>
-              <a:tblGrid>
-                <a:gridCol w="2056192">
-                  <a:extLst>
-                    <a:ext uri="{9D8B030D-6E8A-4147-A177-3AD203B41FA5}">
-                      <a16:colId xmlns:a16="http://schemas.microsoft.com/office/drawing/2014/main" val="724543574"/>
-                    </a:ext>
-                  </a:extLst>
-                </a:gridCol>
-              </a:tblGrid>
-              <a:tr h="545847">
-                <a:tc>
-                  <a:txBody>
-                    <a:bodyPr/>
-                    <a:lstStyle/>
-                    <a:p>
-                      <a:r>
-                        <a:rPr lang="de-DE" dirty="0" err="1"/>
-                        <a:t>Collected</a:t>
-                      </a:r>
-                      <a:r>
-                        <a:rPr lang="de-DE" dirty="0"/>
-                        <a:t> </a:t>
-                      </a:r>
-                      <a:r>
-                        <a:rPr lang="de-DE" dirty="0" err="1"/>
-                        <a:t>data</a:t>
-                      </a:r>
-                      <a:endParaRPr lang="de-DE" dirty="0"/>
-                    </a:p>
-                  </a:txBody>
-                  <a:tcPr>
-                    <a:lnL w="12700" cap="flat" cmpd="sng" algn="ctr">
-                      <a:solidFill>
-                        <a:schemeClr val="tx1"/>
-                      </a:solidFill>
-                      <a:prstDash val="solid"/>
-                      <a:round/>
-                      <a:headEnd type="none" w="med" len="med"/>
-                      <a:tailEnd type="none" w="med" len="med"/>
-                    </a:lnL>
-                    <a:lnR w="12700" cap="flat" cmpd="sng" algn="ctr">
-                      <a:solidFill>
-                        <a:schemeClr val="tx1"/>
-                      </a:solidFill>
-                      <a:prstDash val="solid"/>
-                      <a:round/>
-                      <a:headEnd type="none" w="med" len="med"/>
-                      <a:tailEnd type="none" w="med" len="med"/>
-                    </a:lnR>
-                    <a:lnT w="12700" cap="flat" cmpd="sng" algn="ctr">
-                      <a:solidFill>
-                        <a:schemeClr val="tx1"/>
-                      </a:solidFill>
-                      <a:prstDash val="solid"/>
-                      <a:round/>
-                      <a:headEnd type="none" w="med" len="med"/>
-                      <a:tailEnd type="none" w="med" len="med"/>
-                    </a:lnT>
-                    <a:lnB w="12700" cap="flat" cmpd="sng" algn="ctr">
-                      <a:noFill/>
-                      <a:prstDash val="solid"/>
-                      <a:round/>
-                      <a:headEnd type="none" w="med" len="med"/>
-                      <a:tailEnd type="none" w="med" len="med"/>
-                    </a:lnB>
-                    <a:lnTlToBr w="12700" cmpd="sng">
-                      <a:noFill/>
-                      <a:prstDash val="solid"/>
-                    </a:lnTlToBr>
-                    <a:lnBlToTr w="12700" cmpd="sng">
-                      <a:noFill/>
-                      <a:prstDash val="solid"/>
-                    </a:lnBlToTr>
-                  </a:tcPr>
-                </a:tc>
-                <a:extLst>
-                  <a:ext uri="{0D108BD9-81ED-4DB2-BD59-A6C34878D82A}">
-                    <a16:rowId xmlns:a16="http://schemas.microsoft.com/office/drawing/2014/main" val="4090562286"/>
-                  </a:ext>
-                </a:extLst>
-              </a:tr>
-              <a:tr h="545847">
-                <a:tc>
-                  <a:txBody>
-                    <a:bodyPr/>
-                    <a:lstStyle/>
-                    <a:p>
-                      <a:r>
-                        <a:rPr lang="de-DE" dirty="0" err="1"/>
-                        <a:t>UserID</a:t>
-                      </a:r>
-                      <a:endParaRPr lang="de-DE" dirty="0"/>
-                    </a:p>
-                  </a:txBody>
-                  <a:tcPr>
-                    <a:lnL w="12700" cap="flat" cmpd="sng" algn="ctr">
-                      <a:solidFill>
-                        <a:schemeClr val="tx1"/>
-                      </a:solidFill>
-                      <a:prstDash val="solid"/>
-                      <a:round/>
-                      <a:headEnd type="none" w="med" len="med"/>
-                      <a:tailEnd type="none" w="med" len="med"/>
-                    </a:lnL>
-                    <a:lnR w="12700" cap="flat" cmpd="sng" algn="ctr">
-                      <a:solidFill>
-                        <a:schemeClr val="tx1"/>
-                      </a:solidFill>
-                      <a:prstDash val="solid"/>
-                      <a:round/>
-                      <a:headEnd type="none" w="med" len="med"/>
-                      <a:tailEnd type="none" w="med" len="med"/>
-                    </a:lnR>
-                    <a:lnT w="12700" cap="flat" cmpd="sng" algn="ctr">
-                      <a:noFill/>
-                      <a:prstDash val="solid"/>
-                      <a:round/>
-                      <a:headEnd type="none" w="med" len="med"/>
-                      <a:tailEnd type="none" w="med" len="med"/>
-                    </a:lnT>
-                    <a:lnB w="12700" cap="flat" cmpd="sng" algn="ctr">
-                      <a:noFill/>
-                      <a:prstDash val="solid"/>
-                      <a:round/>
-                      <a:headEnd type="none" w="med" len="med"/>
-                      <a:tailEnd type="none" w="med" len="med"/>
-                    </a:lnB>
-                    <a:lnTlToBr w="12700" cmpd="sng">
-                      <a:noFill/>
-                      <a:prstDash val="solid"/>
-                    </a:lnTlToBr>
-                    <a:lnBlToTr w="12700" cmpd="sng">
-                      <a:noFill/>
-                      <a:prstDash val="solid"/>
-                    </a:lnBlToTr>
-                  </a:tcPr>
-                </a:tc>
-                <a:extLst>
-                  <a:ext uri="{0D108BD9-81ED-4DB2-BD59-A6C34878D82A}">
-                    <a16:rowId xmlns:a16="http://schemas.microsoft.com/office/drawing/2014/main" val="3417067981"/>
-                  </a:ext>
-                </a:extLst>
-              </a:tr>
-              <a:tr h="545847">
-                <a:tc>
-                  <a:txBody>
-                    <a:bodyPr/>
-                    <a:lstStyle/>
-                    <a:p>
-                      <a:r>
-                        <a:rPr lang="de-DE" dirty="0" err="1"/>
-                        <a:t>Timestamp</a:t>
-                      </a:r>
-                      <a:endParaRPr lang="de-DE" dirty="0"/>
-                    </a:p>
-                  </a:txBody>
-                  <a:tcPr>
-                    <a:lnL w="12700" cap="flat" cmpd="sng" algn="ctr">
-                      <a:solidFill>
-                        <a:schemeClr val="tx1"/>
-                      </a:solidFill>
-                      <a:prstDash val="solid"/>
-                      <a:round/>
-                      <a:headEnd type="none" w="med" len="med"/>
-                      <a:tailEnd type="none" w="med" len="med"/>
-                    </a:lnL>
-                    <a:lnR w="12700" cap="flat" cmpd="sng" algn="ctr">
-                      <a:solidFill>
-                        <a:schemeClr val="tx1"/>
-                      </a:solidFill>
-                      <a:prstDash val="solid"/>
-                      <a:round/>
-                      <a:headEnd type="none" w="med" len="med"/>
-                      <a:tailEnd type="none" w="med" len="med"/>
-                    </a:lnR>
-                    <a:lnT w="12700" cap="flat" cmpd="sng" algn="ctr">
-                      <a:noFill/>
-                      <a:prstDash val="solid"/>
-                      <a:round/>
-                      <a:headEnd type="none" w="med" len="med"/>
-                      <a:tailEnd type="none" w="med" len="med"/>
-                    </a:lnT>
-                    <a:lnB w="12700" cap="flat" cmpd="sng" algn="ctr">
-                      <a:noFill/>
-                      <a:prstDash val="solid"/>
-                      <a:round/>
-                      <a:headEnd type="none" w="med" len="med"/>
-                      <a:tailEnd type="none" w="med" len="med"/>
-                    </a:lnB>
-                    <a:lnTlToBr w="12700" cmpd="sng">
-                      <a:noFill/>
-                      <a:prstDash val="solid"/>
-                    </a:lnTlToBr>
-                    <a:lnBlToTr w="12700" cmpd="sng">
-                      <a:noFill/>
-                      <a:prstDash val="solid"/>
-                    </a:lnBlToTr>
-                  </a:tcPr>
-                </a:tc>
-                <a:extLst>
-                  <a:ext uri="{0D108BD9-81ED-4DB2-BD59-A6C34878D82A}">
-                    <a16:rowId xmlns:a16="http://schemas.microsoft.com/office/drawing/2014/main" val="263320400"/>
-                  </a:ext>
-                </a:extLst>
-              </a:tr>
-              <a:tr h="545847">
-                <a:tc>
-                  <a:txBody>
-                    <a:bodyPr/>
-                    <a:lstStyle/>
-                    <a:p>
-                      <a:r>
-                        <a:rPr lang="de-DE" dirty="0" err="1"/>
-                        <a:t>TargetID</a:t>
-                      </a:r>
-                      <a:endParaRPr lang="de-DE" dirty="0"/>
-                    </a:p>
-                  </a:txBody>
-                  <a:tcPr>
-                    <a:lnL w="12700" cap="flat" cmpd="sng" algn="ctr">
-                      <a:solidFill>
-                        <a:schemeClr val="tx1"/>
-                      </a:solidFill>
-                      <a:prstDash val="solid"/>
-                      <a:round/>
-                      <a:headEnd type="none" w="med" len="med"/>
-                      <a:tailEnd type="none" w="med" len="med"/>
-                    </a:lnL>
-                    <a:lnR w="12700" cap="flat" cmpd="sng" algn="ctr">
-                      <a:solidFill>
-                        <a:schemeClr val="tx1"/>
-                      </a:solidFill>
-                      <a:prstDash val="solid"/>
-                      <a:round/>
-                      <a:headEnd type="none" w="med" len="med"/>
-                      <a:tailEnd type="none" w="med" len="med"/>
-                    </a:lnR>
-                    <a:lnT w="12700" cap="flat" cmpd="sng" algn="ctr">
-                      <a:noFill/>
-                      <a:prstDash val="solid"/>
-                      <a:round/>
-                      <a:headEnd type="none" w="med" len="med"/>
-                      <a:tailEnd type="none" w="med" len="med"/>
-                    </a:lnT>
-                    <a:lnB w="12700" cap="flat" cmpd="sng" algn="ctr">
-                      <a:noFill/>
-                      <a:prstDash val="solid"/>
-                      <a:round/>
-                      <a:headEnd type="none" w="med" len="med"/>
-                      <a:tailEnd type="none" w="med" len="med"/>
-                    </a:lnB>
-                    <a:lnTlToBr w="12700" cmpd="sng">
-                      <a:noFill/>
-                      <a:prstDash val="solid"/>
-                    </a:lnTlToBr>
-                    <a:lnBlToTr w="12700" cmpd="sng">
-                      <a:noFill/>
-                      <a:prstDash val="solid"/>
-                    </a:lnBlToTr>
-                  </a:tcPr>
-                </a:tc>
-                <a:extLst>
-                  <a:ext uri="{0D108BD9-81ED-4DB2-BD59-A6C34878D82A}">
-                    <a16:rowId xmlns:a16="http://schemas.microsoft.com/office/drawing/2014/main" val="972984989"/>
-                  </a:ext>
-                </a:extLst>
-              </a:tr>
-              <a:tr h="545847">
-                <a:tc>
-                  <a:txBody>
-                    <a:bodyPr/>
-                    <a:lstStyle/>
-                    <a:p>
-                      <a:r>
-                        <a:rPr lang="de-DE" dirty="0" err="1"/>
-                        <a:t>Condition</a:t>
-                      </a:r>
-                      <a:endParaRPr lang="de-DE" dirty="0"/>
-                    </a:p>
-                  </a:txBody>
-                  <a:tcPr>
-                    <a:lnL w="12700" cap="flat" cmpd="sng" algn="ctr">
-                      <a:solidFill>
-                        <a:schemeClr val="tx1"/>
-                      </a:solidFill>
-                      <a:prstDash val="solid"/>
-                      <a:round/>
-                      <a:headEnd type="none" w="med" len="med"/>
-                      <a:tailEnd type="none" w="med" len="med"/>
-                    </a:lnL>
-                    <a:lnR w="12700" cap="flat" cmpd="sng" algn="ctr">
-                      <a:solidFill>
-                        <a:schemeClr val="tx1"/>
-                      </a:solidFill>
-                      <a:prstDash val="solid"/>
-                      <a:round/>
-                      <a:headEnd type="none" w="med" len="med"/>
-                      <a:tailEnd type="none" w="med" len="med"/>
-                    </a:lnR>
-                    <a:lnT w="12700" cap="flat" cmpd="sng" algn="ctr">
-                      <a:noFill/>
-                      <a:prstDash val="solid"/>
-                      <a:round/>
-                      <a:headEnd type="none" w="med" len="med"/>
-                      <a:tailEnd type="none" w="med" len="med"/>
-                    </a:lnT>
-                    <a:lnB w="12700" cap="flat" cmpd="sng" algn="ctr">
-                      <a:noFill/>
-                      <a:prstDash val="solid"/>
-                      <a:round/>
-                      <a:headEnd type="none" w="med" len="med"/>
-                      <a:tailEnd type="none" w="med" len="med"/>
-                    </a:lnB>
-                    <a:lnTlToBr w="12700" cmpd="sng">
-                      <a:noFill/>
-                      <a:prstDash val="solid"/>
-                    </a:lnTlToBr>
-                    <a:lnBlToTr w="12700" cmpd="sng">
-                      <a:noFill/>
-                      <a:prstDash val="solid"/>
-                    </a:lnBlToTr>
-                  </a:tcPr>
-                </a:tc>
-                <a:extLst>
-                  <a:ext uri="{0D108BD9-81ED-4DB2-BD59-A6C34878D82A}">
-                    <a16:rowId xmlns:a16="http://schemas.microsoft.com/office/drawing/2014/main" val="4371834"/>
-                  </a:ext>
-                </a:extLst>
-              </a:tr>
-              <a:tr h="545847">
-                <a:tc>
-                  <a:txBody>
-                    <a:bodyPr/>
-                    <a:lstStyle/>
-                    <a:p>
-                      <a:r>
-                        <a:rPr lang="de-DE" dirty="0"/>
-                        <a:t>Position</a:t>
-                      </a:r>
-                    </a:p>
-                  </a:txBody>
-                  <a:tcPr>
-                    <a:lnL w="12700" cap="flat" cmpd="sng" algn="ctr">
-                      <a:solidFill>
-                        <a:schemeClr val="tx1"/>
-                      </a:solidFill>
-                      <a:prstDash val="solid"/>
-                      <a:round/>
-                      <a:headEnd type="none" w="med" len="med"/>
-                      <a:tailEnd type="none" w="med" len="med"/>
-                    </a:lnL>
-                    <a:lnR w="12700" cap="flat" cmpd="sng" algn="ctr">
-                      <a:solidFill>
-                        <a:schemeClr val="tx1"/>
-                      </a:solidFill>
-                      <a:prstDash val="solid"/>
-                      <a:round/>
-                      <a:headEnd type="none" w="med" len="med"/>
-                      <a:tailEnd type="none" w="med" len="med"/>
-                    </a:lnR>
-                    <a:lnT w="12700" cap="flat" cmpd="sng" algn="ctr">
-                      <a:noFill/>
-                      <a:prstDash val="solid"/>
-                      <a:round/>
-                      <a:headEnd type="none" w="med" len="med"/>
-                      <a:tailEnd type="none" w="med" len="med"/>
-                    </a:lnT>
-                    <a:lnB w="12700" cap="flat" cmpd="sng" algn="ctr">
-                      <a:noFill/>
-                      <a:prstDash val="solid"/>
-                      <a:round/>
-                      <a:headEnd type="none" w="med" len="med"/>
-                      <a:tailEnd type="none" w="med" len="med"/>
-                    </a:lnB>
-                    <a:lnTlToBr w="12700" cmpd="sng">
-                      <a:noFill/>
-                      <a:prstDash val="solid"/>
-                    </a:lnTlToBr>
-                    <a:lnBlToTr w="12700" cmpd="sng">
-                      <a:noFill/>
-                      <a:prstDash val="solid"/>
-                    </a:lnBlToTr>
-                  </a:tcPr>
-                </a:tc>
-                <a:extLst>
-                  <a:ext uri="{0D108BD9-81ED-4DB2-BD59-A6C34878D82A}">
-                    <a16:rowId xmlns:a16="http://schemas.microsoft.com/office/drawing/2014/main" val="575484830"/>
-                  </a:ext>
-                </a:extLst>
-              </a:tr>
-              <a:tr h="545847">
-                <a:tc>
-                  <a:txBody>
-                    <a:bodyPr/>
-                    <a:lstStyle/>
-                    <a:p>
-                      <a:r>
-                        <a:rPr lang="de-DE" dirty="0" err="1"/>
-                        <a:t>Capacitive</a:t>
-                      </a:r>
-                      <a:r>
-                        <a:rPr lang="de-DE" dirty="0"/>
-                        <a:t> </a:t>
-                      </a:r>
-                      <a:r>
-                        <a:rPr lang="de-DE" dirty="0" err="1"/>
-                        <a:t>image</a:t>
-                      </a:r>
-                      <a:endParaRPr lang="de-DE" dirty="0"/>
-                    </a:p>
-                  </a:txBody>
-                  <a:tcPr>
-                    <a:lnL w="12700" cap="flat" cmpd="sng" algn="ctr">
-                      <a:solidFill>
-                        <a:schemeClr val="tx1"/>
-                      </a:solidFill>
-                      <a:prstDash val="solid"/>
-                      <a:round/>
-                      <a:headEnd type="none" w="med" len="med"/>
-                      <a:tailEnd type="none" w="med" len="med"/>
-                    </a:lnL>
-                    <a:lnR w="12700" cap="flat" cmpd="sng" algn="ctr">
-                      <a:solidFill>
-                        <a:schemeClr val="tx1"/>
-                      </a:solidFill>
-                      <a:prstDash val="solid"/>
-                      <a:round/>
-                      <a:headEnd type="none" w="med" len="med"/>
-                      <a:tailEnd type="none" w="med" len="med"/>
-                    </a:lnR>
-                    <a:lnT w="12700" cap="flat" cmpd="sng" algn="ctr">
-                      <a:noFill/>
-                      <a:prstDash val="solid"/>
-                      <a:round/>
-                      <a:headEnd type="none" w="med" len="med"/>
-                      <a:tailEnd type="none" w="med" len="med"/>
-                    </a:lnT>
-                    <a:lnB w="12700" cap="flat" cmpd="sng" algn="ctr">
-                      <a:solidFill>
-                        <a:schemeClr val="tx1"/>
-                      </a:solidFill>
-                      <a:prstDash val="solid"/>
-                      <a:round/>
-                      <a:headEnd type="none" w="med" len="med"/>
-                      <a:tailEnd type="none" w="med" len="med"/>
-                    </a:lnB>
-                    <a:lnTlToBr w="12700" cmpd="sng">
-                      <a:noFill/>
-                      <a:prstDash val="solid"/>
-                    </a:lnTlToBr>
-                    <a:lnBlToTr w="12700" cmpd="sng">
-                      <a:noFill/>
-                      <a:prstDash val="solid"/>
-                    </a:lnBlToTr>
-                  </a:tcPr>
-                </a:tc>
-                <a:extLst>
-                  <a:ext uri="{0D108BD9-81ED-4DB2-BD59-A6C34878D82A}">
-                    <a16:rowId xmlns:a16="http://schemas.microsoft.com/office/drawing/2014/main" val="3890628370"/>
-                  </a:ext>
-                </a:extLst>
-              </a:tr>
-            </a:tbl>
-          </a:graphicData>
-        </a:graphic>
-      </p:graphicFrame>
-      <p:pic>
-        <p:nvPicPr>
-          <p:cNvPr id="19" name="Grafik 18">
-            <a:extLst>
-              <a:ext uri="{FF2B5EF4-FFF2-40B4-BE49-F238E27FC236}">
-                <a16:creationId xmlns:a16="http://schemas.microsoft.com/office/drawing/2014/main" id="{EFE059CC-058F-4D2F-86A6-33ADFEDC0214}"/>
+                <a16:creationId xmlns:a16="http://schemas.microsoft.com/office/drawing/2014/main" id="{B42814CA-1C86-4FAC-9FA2-E1A4A676B4A4}"/>
               </a:ext>
             </a:extLst>
           </p:cNvPr>
@@ -5148,7 +4255,7 @@
         </p:blipFill>
         <p:spPr>
           <a:xfrm>
-            <a:off x="4483906" y="926526"/>
+            <a:off x="3629531" y="965068"/>
             <a:ext cx="1884938" cy="3820928"/>
           </a:xfrm>
           <a:prstGeom prst="rect">
@@ -5158,10 +4265,10 @@
       </p:pic>
       <p:sp>
         <p:nvSpPr>
-          <p:cNvPr id="20" name="Textfeld 19">
+          <p:cNvPr id="7" name="Textfeld 6">
             <a:extLst>
               <a:ext uri="{FF2B5EF4-FFF2-40B4-BE49-F238E27FC236}">
-                <a16:creationId xmlns:a16="http://schemas.microsoft.com/office/drawing/2014/main" id="{F475AA56-1570-4BFF-899A-8ED909FBC71F}"/>
+                <a16:creationId xmlns:a16="http://schemas.microsoft.com/office/drawing/2014/main" id="{50DB8E9A-5381-4A7B-881A-262D5DDE2BC9}"/>
               </a:ext>
             </a:extLst>
           </p:cNvPr>
@@ -5170,7 +4277,7 @@
         </p:nvSpPr>
         <p:spPr>
           <a:xfrm>
-            <a:off x="4555914" y="1562485"/>
+            <a:off x="3707904" y="1761186"/>
             <a:ext cx="1728191" cy="400110"/>
           </a:xfrm>
           <a:prstGeom prst="rect">
@@ -5199,10 +4306,10 @@
       </p:sp>
       <p:sp>
         <p:nvSpPr>
-          <p:cNvPr id="21" name="Textfeld 20">
+          <p:cNvPr id="8" name="Textfeld 7">
             <a:extLst>
               <a:ext uri="{FF2B5EF4-FFF2-40B4-BE49-F238E27FC236}">
-                <a16:creationId xmlns:a16="http://schemas.microsoft.com/office/drawing/2014/main" id="{BFF228F0-93AD-4135-B851-21E2412E0D09}"/>
+                <a16:creationId xmlns:a16="http://schemas.microsoft.com/office/drawing/2014/main" id="{E100F715-C300-40FB-8732-F579C176C682}"/>
               </a:ext>
             </a:extLst>
           </p:cNvPr>
@@ -5211,7 +4318,7 @@
         </p:nvSpPr>
         <p:spPr>
           <a:xfrm>
-            <a:off x="4987962" y="1950607"/>
+            <a:off x="4139954" y="2095821"/>
             <a:ext cx="942468" cy="338554"/>
           </a:xfrm>
           <a:prstGeom prst="rect">
@@ -5239,10 +4346,10 @@
       </p:sp>
       <p:sp>
         <p:nvSpPr>
-          <p:cNvPr id="22" name="Ellipse 21">
+          <p:cNvPr id="9" name="Ellipse 8">
             <a:extLst>
               <a:ext uri="{FF2B5EF4-FFF2-40B4-BE49-F238E27FC236}">
-                <a16:creationId xmlns:a16="http://schemas.microsoft.com/office/drawing/2014/main" id="{582512B4-C708-4B2C-A72B-A4F8E7B16CE9}"/>
+                <a16:creationId xmlns:a16="http://schemas.microsoft.com/office/drawing/2014/main" id="{D3753840-58F4-4A8A-876F-08E7FF585157}"/>
               </a:ext>
             </a:extLst>
           </p:cNvPr>
@@ -5251,7 +4358,7 @@
         </p:nvSpPr>
         <p:spPr>
           <a:xfrm>
-            <a:off x="4883132" y="2551245"/>
+            <a:off x="4932040" y="3047679"/>
             <a:ext cx="216024" cy="216000"/>
           </a:xfrm>
           <a:prstGeom prst="ellipse">
@@ -5290,216 +4397,263 @@
       </p:sp>
       <p:sp>
         <p:nvSpPr>
-          <p:cNvPr id="27" name="Ellipse 26">
+          <p:cNvPr id="12" name="Inhaltsplatzhalter 1">
             <a:extLst>
               <a:ext uri="{FF2B5EF4-FFF2-40B4-BE49-F238E27FC236}">
-                <a16:creationId xmlns:a16="http://schemas.microsoft.com/office/drawing/2014/main" id="{168C1968-1543-40B9-B137-30D156E268AF}"/>
+                <a16:creationId xmlns:a16="http://schemas.microsoft.com/office/drawing/2014/main" id="{3D7784D7-4818-4E43-B5A9-583A6A3F929F}"/>
               </a:ext>
             </a:extLst>
           </p:cNvPr>
-          <p:cNvSpPr/>
+          <p:cNvSpPr txBox="1">
+            <a:spLocks/>
+          </p:cNvSpPr>
           <p:nvPr/>
         </p:nvSpPr>
         <p:spPr>
           <a:xfrm>
-            <a:off x="5135616" y="3662830"/>
-            <a:ext cx="216024" cy="216000"/>
+            <a:off x="5982066" y="1202574"/>
+            <a:ext cx="2910414" cy="3400026"/>
           </a:xfrm>
-          <a:prstGeom prst="ellipse">
+          <a:prstGeom prst="rect">
             <a:avLst/>
           </a:prstGeom>
-          <a:ln>
-            <a:solidFill>
-              <a:schemeClr val="accent3"/>
-            </a:solidFill>
-          </a:ln>
         </p:spPr>
-        <p:style>
-          <a:lnRef idx="2">
-            <a:schemeClr val="accent3">
-              <a:shade val="50000"/>
-            </a:schemeClr>
-          </a:lnRef>
-          <a:fillRef idx="1">
-            <a:schemeClr val="accent3"/>
-          </a:fillRef>
-          <a:effectRef idx="0">
-            <a:schemeClr val="accent3"/>
-          </a:effectRef>
-          <a:fontRef idx="minor">
-            <a:schemeClr val="lt1"/>
-          </a:fontRef>
-        </p:style>
-        <p:txBody>
-          <a:bodyPr rtlCol="0" anchor="ctr"/>
-          <a:lstStyle/>
-          <a:p>
-            <a:pPr algn="ctr"/>
-            <a:endParaRPr lang="de-DE"/>
-          </a:p>
-        </p:txBody>
-      </p:sp>
-      <p:sp>
-        <p:nvSpPr>
-          <p:cNvPr id="28" name="Ellipse 27">
-            <a:extLst>
-              <a:ext uri="{FF2B5EF4-FFF2-40B4-BE49-F238E27FC236}">
-                <a16:creationId xmlns:a16="http://schemas.microsoft.com/office/drawing/2014/main" id="{03D2D10C-EA9D-4B8C-919D-3AA9BDDD6CBB}"/>
-              </a:ext>
-            </a:extLst>
-          </p:cNvPr>
-          <p:cNvSpPr/>
-          <p:nvPr/>
-        </p:nvSpPr>
-        <p:spPr>
-          <a:xfrm>
-            <a:off x="5714406" y="2925276"/>
-            <a:ext cx="216024" cy="216000"/>
-          </a:xfrm>
-          <a:prstGeom prst="ellipse">
-            <a:avLst/>
-          </a:prstGeom>
-          <a:ln>
-            <a:solidFill>
-              <a:schemeClr val="accent3"/>
-            </a:solidFill>
-          </a:ln>
-        </p:spPr>
-        <p:style>
-          <a:lnRef idx="2">
-            <a:schemeClr val="accent3">
-              <a:shade val="50000"/>
-            </a:schemeClr>
-          </a:lnRef>
-          <a:fillRef idx="1">
-            <a:schemeClr val="accent3"/>
-          </a:fillRef>
-          <a:effectRef idx="0">
-            <a:schemeClr val="accent3"/>
-          </a:effectRef>
-          <a:fontRef idx="minor">
-            <a:schemeClr val="lt1"/>
-          </a:fontRef>
-        </p:style>
-        <p:txBody>
-          <a:bodyPr rtlCol="0" anchor="ctr"/>
-          <a:lstStyle/>
-          <a:p>
-            <a:pPr algn="ctr"/>
-            <a:endParaRPr lang="de-DE" dirty="0"/>
-          </a:p>
-        </p:txBody>
-      </p:sp>
-      <p:sp>
-        <p:nvSpPr>
-          <p:cNvPr id="32" name="Inhaltsplatzhalter 1">
-            <a:extLst>
-              <a:ext uri="{FF2B5EF4-FFF2-40B4-BE49-F238E27FC236}">
-                <a16:creationId xmlns:a16="http://schemas.microsoft.com/office/drawing/2014/main" id="{AAEB3B28-A513-4674-9ECC-9876B07CB785}"/>
-              </a:ext>
-            </a:extLst>
-          </p:cNvPr>
-          <p:cNvSpPr>
-            <a:spLocks noGrp="1"/>
-          </p:cNvSpPr>
-          <p:nvPr>
-            <p:ph idx="1"/>
-          </p:nvPr>
-        </p:nvSpPr>
-        <p:spPr>
-          <a:xfrm>
-            <a:off x="272039" y="1067232"/>
-            <a:ext cx="2965840" cy="3400026"/>
-          </a:xfrm>
-        </p:spPr>
-        <p:txBody>
-          <a:bodyPr/>
-          <a:lstStyle/>
-          <a:p>
-            <a:r>
-              <a:rPr lang="de-DE" dirty="0"/>
-              <a:t>Input </a:t>
-            </a:r>
-            <a:r>
-              <a:rPr lang="de-DE" dirty="0" err="1"/>
-              <a:t>method</a:t>
-            </a:r>
-            <a:endParaRPr lang="de-DE" dirty="0"/>
-          </a:p>
-          <a:p>
-            <a:pPr lvl="1"/>
-            <a:r>
-              <a:rPr lang="de-DE" dirty="0"/>
-              <a:t>Finger	</a:t>
-            </a:r>
-          </a:p>
-          <a:p>
-            <a:pPr lvl="1"/>
-            <a:r>
-              <a:rPr lang="de-DE" dirty="0" err="1"/>
-              <a:t>Knuckle</a:t>
-            </a:r>
-            <a:r>
-              <a:rPr lang="de-DE" dirty="0"/>
-              <a:t>	</a:t>
-            </a:r>
-          </a:p>
-          <a:p>
-            <a:r>
-              <a:rPr lang="de-DE" dirty="0" err="1"/>
-              <a:t>Tap</a:t>
-            </a:r>
-            <a:r>
-              <a:rPr lang="de-DE" dirty="0"/>
-              <a:t> Type</a:t>
-            </a:r>
-          </a:p>
-          <a:p>
-            <a:pPr lvl="1"/>
-            <a:r>
-              <a:rPr lang="de-DE" dirty="0" err="1"/>
-              <a:t>Tap</a:t>
-            </a:r>
-            <a:r>
-              <a:rPr lang="de-DE" dirty="0"/>
-              <a:t>	</a:t>
-            </a:r>
-          </a:p>
-          <a:p>
-            <a:pPr lvl="1"/>
-            <a:r>
-              <a:rPr lang="de-DE" dirty="0"/>
-              <a:t>Double-</a:t>
-            </a:r>
-            <a:r>
-              <a:rPr lang="de-DE" dirty="0" err="1"/>
-              <a:t>Tap</a:t>
-            </a:r>
-            <a:endParaRPr lang="de-DE" dirty="0"/>
-          </a:p>
-          <a:p>
-            <a:pPr lvl="1"/>
-            <a:r>
-              <a:rPr lang="de-DE" dirty="0"/>
-              <a:t>Long-Press</a:t>
-            </a:r>
-          </a:p>
-          <a:p>
-            <a:r>
-              <a:rPr lang="de-DE" dirty="0" err="1"/>
-              <a:t>Randomized</a:t>
-            </a:r>
-            <a:r>
-              <a:rPr lang="de-DE" dirty="0"/>
-              <a:t> Targets</a:t>
-            </a:r>
+        <p:txBody>
+          <a:bodyPr vert="horz" lIns="91440" tIns="45720" rIns="91440" bIns="45720" rtlCol="0">
+            <a:normAutofit/>
+          </a:bodyPr>
+          <a:lstStyle>
+            <a:lvl1pPr marL="342900" indent="-342900" algn="l" defTabSz="914400" rtl="0" eaLnBrk="1" latinLnBrk="0" hangingPunct="1">
+              <a:spcBef>
+                <a:spcPct val="20000"/>
+              </a:spcBef>
+              <a:buClr>
+                <a:srgbClr val="137CBE"/>
+              </a:buClr>
+              <a:buFont typeface="Wingdings" pitchFamily="2" charset="2"/>
+              <a:buChar char="§"/>
+              <a:defRPr sz="2000" kern="1200">
+                <a:solidFill>
+                  <a:schemeClr val="tx1"/>
+                </a:solidFill>
+                <a:latin typeface="+mn-lt"/>
+                <a:ea typeface="Segoe UI" pitchFamily="34" charset="0"/>
+                <a:cs typeface="Segoe UI" pitchFamily="34" charset="0"/>
+              </a:defRPr>
+            </a:lvl1pPr>
+            <a:lvl2pPr marL="742950" indent="-285750" algn="l" defTabSz="914400" rtl="0" eaLnBrk="1" latinLnBrk="0" hangingPunct="1">
+              <a:spcBef>
+                <a:spcPct val="20000"/>
+              </a:spcBef>
+              <a:buClr>
+                <a:srgbClr val="137CBE"/>
+              </a:buClr>
+              <a:buFont typeface="Wingdings" pitchFamily="2" charset="2"/>
+              <a:buChar char="§"/>
+              <a:defRPr sz="1800" kern="1200">
+                <a:solidFill>
+                  <a:schemeClr val="tx1"/>
+                </a:solidFill>
+                <a:latin typeface="+mn-lt"/>
+                <a:ea typeface="Segoe UI" pitchFamily="34" charset="0"/>
+                <a:cs typeface="Segoe UI" pitchFamily="34" charset="0"/>
+              </a:defRPr>
+            </a:lvl2pPr>
+            <a:lvl3pPr marL="1143000" indent="-228600" algn="l" defTabSz="914400" rtl="0" eaLnBrk="1" latinLnBrk="0" hangingPunct="1">
+              <a:spcBef>
+                <a:spcPct val="20000"/>
+              </a:spcBef>
+              <a:buClr>
+                <a:srgbClr val="137CBE"/>
+              </a:buClr>
+              <a:buFont typeface="Wingdings" pitchFamily="2" charset="2"/>
+              <a:buChar char="§"/>
+              <a:defRPr sz="1600" kern="1200">
+                <a:solidFill>
+                  <a:schemeClr val="tx1"/>
+                </a:solidFill>
+                <a:latin typeface="+mn-lt"/>
+                <a:ea typeface="Segoe UI" pitchFamily="34" charset="0"/>
+                <a:cs typeface="Segoe UI" pitchFamily="34" charset="0"/>
+              </a:defRPr>
+            </a:lvl3pPr>
+            <a:lvl4pPr marL="1600200" indent="-228600" algn="l" defTabSz="914400" rtl="0" eaLnBrk="1" latinLnBrk="0" hangingPunct="1">
+              <a:spcBef>
+                <a:spcPct val="20000"/>
+              </a:spcBef>
+              <a:buClr>
+                <a:srgbClr val="137CBE"/>
+              </a:buClr>
+              <a:buFont typeface="Wingdings" pitchFamily="2" charset="2"/>
+              <a:buChar char="§"/>
+              <a:defRPr sz="1400" kern="1200">
+                <a:solidFill>
+                  <a:schemeClr val="tx1"/>
+                </a:solidFill>
+                <a:latin typeface="+mn-lt"/>
+                <a:ea typeface="Segoe UI" pitchFamily="34" charset="0"/>
+                <a:cs typeface="Segoe UI" pitchFamily="34" charset="0"/>
+              </a:defRPr>
+            </a:lvl4pPr>
+            <a:lvl5pPr marL="2057400" indent="-228600" algn="l" defTabSz="914400" rtl="0" eaLnBrk="1" latinLnBrk="0" hangingPunct="1">
+              <a:spcBef>
+                <a:spcPct val="20000"/>
+              </a:spcBef>
+              <a:buClr>
+                <a:srgbClr val="137CBE"/>
+              </a:buClr>
+              <a:buFont typeface="Wingdings" pitchFamily="2" charset="2"/>
+              <a:buChar char="§"/>
+              <a:defRPr sz="1400" kern="1200">
+                <a:solidFill>
+                  <a:schemeClr val="tx1"/>
+                </a:solidFill>
+                <a:latin typeface="+mn-lt"/>
+                <a:ea typeface="Segoe UI" pitchFamily="34" charset="0"/>
+                <a:cs typeface="Segoe UI" pitchFamily="34" charset="0"/>
+              </a:defRPr>
+            </a:lvl5pPr>
+            <a:lvl6pPr marL="2514600" indent="-228600" algn="l" defTabSz="914400" rtl="0" eaLnBrk="1" latinLnBrk="0" hangingPunct="1">
+              <a:spcBef>
+                <a:spcPct val="20000"/>
+              </a:spcBef>
+              <a:buFont typeface="Arial" pitchFamily="34" charset="0"/>
+              <a:buChar char="•"/>
+              <a:defRPr sz="2000" kern="1200">
+                <a:solidFill>
+                  <a:schemeClr val="tx1"/>
+                </a:solidFill>
+                <a:latin typeface="+mn-lt"/>
+                <a:ea typeface="+mn-ea"/>
+                <a:cs typeface="+mn-cs"/>
+              </a:defRPr>
+            </a:lvl6pPr>
+            <a:lvl7pPr marL="2971800" indent="-228600" algn="l" defTabSz="914400" rtl="0" eaLnBrk="1" latinLnBrk="0" hangingPunct="1">
+              <a:spcBef>
+                <a:spcPct val="20000"/>
+              </a:spcBef>
+              <a:buFont typeface="Arial" pitchFamily="34" charset="0"/>
+              <a:buChar char="•"/>
+              <a:defRPr sz="2000" kern="1200">
+                <a:solidFill>
+                  <a:schemeClr val="tx1"/>
+                </a:solidFill>
+                <a:latin typeface="+mn-lt"/>
+                <a:ea typeface="+mn-ea"/>
+                <a:cs typeface="+mn-cs"/>
+              </a:defRPr>
+            </a:lvl7pPr>
+            <a:lvl8pPr marL="3429000" indent="-228600" algn="l" defTabSz="914400" rtl="0" eaLnBrk="1" latinLnBrk="0" hangingPunct="1">
+              <a:spcBef>
+                <a:spcPct val="20000"/>
+              </a:spcBef>
+              <a:buFont typeface="Arial" pitchFamily="34" charset="0"/>
+              <a:buChar char="•"/>
+              <a:defRPr sz="2000" kern="1200">
+                <a:solidFill>
+                  <a:schemeClr val="tx1"/>
+                </a:solidFill>
+                <a:latin typeface="+mn-lt"/>
+                <a:ea typeface="+mn-ea"/>
+                <a:cs typeface="+mn-cs"/>
+              </a:defRPr>
+            </a:lvl8pPr>
+            <a:lvl9pPr marL="3886200" indent="-228600" algn="l" defTabSz="914400" rtl="0" eaLnBrk="1" latinLnBrk="0" hangingPunct="1">
+              <a:spcBef>
+                <a:spcPct val="20000"/>
+              </a:spcBef>
+              <a:buFont typeface="Arial" pitchFamily="34" charset="0"/>
+              <a:buChar char="•"/>
+              <a:defRPr sz="2000" kern="1200">
+                <a:solidFill>
+                  <a:schemeClr val="tx1"/>
+                </a:solidFill>
+                <a:latin typeface="+mn-lt"/>
+                <a:ea typeface="+mn-ea"/>
+                <a:cs typeface="+mn-cs"/>
+              </a:defRPr>
+            </a:lvl9pPr>
+          </a:lstStyle>
+          <a:p>
+            <a:pPr fontAlgn="t"/>
+            <a:r>
+              <a:rPr lang="de-DE" dirty="0" err="1"/>
+              <a:t>Collected</a:t>
+            </a:r>
+            <a:r>
+              <a:rPr lang="de-DE" b="1" dirty="0"/>
+              <a:t> </a:t>
+            </a:r>
+            <a:r>
+              <a:rPr lang="de-DE" dirty="0" err="1"/>
+              <a:t>data</a:t>
+            </a:r>
+            <a:endParaRPr lang="de-DE" dirty="0"/>
+          </a:p>
+          <a:p>
+            <a:pPr lvl="1" fontAlgn="t"/>
+            <a:r>
+              <a:rPr lang="de-DE" dirty="0" err="1"/>
+              <a:t>UserID</a:t>
+            </a:r>
+            <a:endParaRPr lang="de-DE" dirty="0"/>
+          </a:p>
+          <a:p>
+            <a:pPr lvl="1" fontAlgn="t"/>
+            <a:r>
+              <a:rPr lang="de-DE" dirty="0" err="1"/>
+              <a:t>Timestamp</a:t>
+            </a:r>
+            <a:endParaRPr lang="de-DE" dirty="0"/>
+          </a:p>
+          <a:p>
+            <a:pPr lvl="1" fontAlgn="t"/>
+            <a:r>
+              <a:rPr lang="de-DE" dirty="0" err="1"/>
+              <a:t>TargetID</a:t>
+            </a:r>
+            <a:endParaRPr lang="de-DE" dirty="0"/>
+          </a:p>
+          <a:p>
+            <a:pPr lvl="1" fontAlgn="t"/>
+            <a:r>
+              <a:rPr lang="de-DE" dirty="0" err="1"/>
+              <a:t>Condition</a:t>
+            </a:r>
+            <a:endParaRPr lang="de-DE" dirty="0"/>
+          </a:p>
+          <a:p>
+            <a:pPr lvl="1" fontAlgn="t"/>
+            <a:r>
+              <a:rPr lang="de-DE" dirty="0"/>
+              <a:t>Position</a:t>
+            </a:r>
+          </a:p>
+          <a:p>
+            <a:pPr lvl="1" fontAlgn="t"/>
+            <a:r>
+              <a:rPr lang="de-DE" dirty="0" err="1"/>
+              <a:t>Capacitive</a:t>
+            </a:r>
+            <a:r>
+              <a:rPr lang="de-DE" dirty="0"/>
+              <a:t> </a:t>
+            </a:r>
+            <a:r>
+              <a:rPr lang="de-DE" dirty="0" err="1"/>
+              <a:t>image</a:t>
+            </a:r>
+            <a:endParaRPr lang="de-DE" dirty="0"/>
+          </a:p>
+          <a:p>
+            <a:endParaRPr lang="de-DE" dirty="0"/>
           </a:p>
         </p:txBody>
       </p:sp>
     </p:spTree>
     <p:extLst>
       <p:ext uri="{BB962C8B-B14F-4D97-AF65-F5344CB8AC3E}">
-        <p14:creationId xmlns:p14="http://schemas.microsoft.com/office/powerpoint/2010/main" val="1974359784"/>
+        <p14:creationId xmlns:p14="http://schemas.microsoft.com/office/powerpoint/2010/main" val="4028138573"/>
       </p:ext>
     </p:extLst>
   </p:cSld>
@@ -5527,7 +4681,7 @@
                             </p:stCondLst>
                             <p:childTnLst>
                               <p:par>
-                                <p:cTn id="5" presetID="1" presetClass="entr" presetSubtype="0" fill="hold" nodeType="clickEffect">
+                                <p:cTn id="5" presetID="1" presetClass="entr" presetSubtype="0" fill="hold" grpId="0" nodeType="clickEffect">
                                   <p:stCondLst>
                                     <p:cond delay="0"/>
                                   </p:stCondLst>
@@ -5540,43 +4694,7 @@
                                           </p:stCondLst>
                                         </p:cTn>
                                         <p:tgtEl>
-                                          <p:spTgt spid="19"/>
-                                        </p:tgtEl>
-                                        <p:attrNameLst>
-                                          <p:attrName>style.visibility</p:attrName>
-                                        </p:attrNameLst>
-                                      </p:cBhvr>
-                                      <p:to>
-                                        <p:strVal val="visible"/>
-                                      </p:to>
-                                    </p:set>
-                                  </p:childTnLst>
-                                </p:cTn>
-                              </p:par>
-                            </p:childTnLst>
-                          </p:cTn>
-                        </p:par>
-                        <p:par>
-                          <p:cTn id="7" fill="hold">
-                            <p:stCondLst>
-                              <p:cond delay="0"/>
-                            </p:stCondLst>
-                            <p:childTnLst>
-                              <p:par>
-                                <p:cTn id="8" presetID="1" presetClass="entr" presetSubtype="0" fill="hold" grpId="0" nodeType="afterEffect">
-                                  <p:stCondLst>
-                                    <p:cond delay="0"/>
-                                  </p:stCondLst>
-                                  <p:childTnLst>
-                                    <p:set>
-                                      <p:cBhvr>
-                                        <p:cTn id="9" dur="1" fill="hold">
-                                          <p:stCondLst>
-                                            <p:cond delay="0"/>
-                                          </p:stCondLst>
-                                        </p:cTn>
-                                        <p:tgtEl>
-                                          <p:spTgt spid="20"/>
+                                          <p:spTgt spid="7"/>
                                         </p:tgtEl>
                                         <p:attrNameLst>
                                           <p:attrName>style.visibility</p:attrName>
@@ -5590,20 +4708,86 @@
                                 </p:cTn>
                               </p:par>
                               <p:par>
-                                <p:cTn id="10" presetID="1" presetClass="entr" presetSubtype="0" fill="hold" grpId="0" nodeType="withEffect">
+                                <p:cTn id="7" presetID="1" presetClass="entr" presetSubtype="0" fill="hold" grpId="0" nodeType="withEffect">
                                   <p:stCondLst>
                                     <p:cond delay="0"/>
                                   </p:stCondLst>
                                   <p:childTnLst>
                                     <p:set>
                                       <p:cBhvr>
-                                        <p:cTn id="11" dur="1" fill="hold">
+                                        <p:cTn id="8" dur="1" fill="hold">
                                           <p:stCondLst>
                                             <p:cond delay="0"/>
                                           </p:stCondLst>
                                         </p:cTn>
                                         <p:tgtEl>
-                                          <p:spTgt spid="21"/>
+                                          <p:spTgt spid="2">
+                                            <p:txEl>
+                                              <p:pRg st="0" end="0"/>
+                                            </p:txEl>
+                                          </p:spTgt>
+                                        </p:tgtEl>
+                                        <p:attrNameLst>
+                                          <p:attrName>style.visibility</p:attrName>
+                                        </p:attrNameLst>
+                                      </p:cBhvr>
+                                      <p:to>
+                                        <p:strVal val="visible"/>
+                                      </p:to>
+                                    </p:set>
+                                  </p:childTnLst>
+                                </p:cTn>
+                              </p:par>
+                              <p:par>
+                                <p:cTn id="9" presetID="1" presetClass="entr" presetSubtype="0" fill="hold" grpId="0" nodeType="withEffect">
+                                  <p:stCondLst>
+                                    <p:cond delay="0"/>
+                                  </p:stCondLst>
+                                  <p:childTnLst>
+                                    <p:set>
+                                      <p:cBhvr>
+                                        <p:cTn id="10" dur="1" fill="hold">
+                                          <p:stCondLst>
+                                            <p:cond delay="0"/>
+                                          </p:stCondLst>
+                                        </p:cTn>
+                                        <p:tgtEl>
+                                          <p:spTgt spid="2">
+                                            <p:txEl>
+                                              <p:pRg st="1" end="1"/>
+                                            </p:txEl>
+                                          </p:spTgt>
+                                        </p:tgtEl>
+                                        <p:attrNameLst>
+                                          <p:attrName>style.visibility</p:attrName>
+                                        </p:attrNameLst>
+                                      </p:cBhvr>
+                                      <p:to>
+                                        <p:strVal val="visible"/>
+                                      </p:to>
+                                    </p:set>
+                                  </p:childTnLst>
+                                </p:cTn>
+                              </p:par>
+                              <p:par>
+                                <p:cTn id="11" presetID="1" presetClass="entr" presetSubtype="0" fill="hold" grpId="0" nodeType="withEffect">
+                                  <p:stCondLst>
+                                    <p:cond delay="0"/>
+                                  </p:stCondLst>
+                                  <p:childTnLst>
+                                    <p:set>
+                                      <p:cBhvr>
+                                        <p:cTn id="12" dur="1" fill="hold">
+                                          <p:stCondLst>
+                                            <p:cond delay="0"/>
+                                          </p:stCondLst>
+                                        </p:cTn>
+                                        <p:tgtEl>
+                                          <p:spTgt spid="2">
+                                            <p:txEl>
+                                              <p:pRg st="2" end="2"/>
+                                            </p:txEl>
+                                          </p:spTgt>
                                         </p:tgtEl>
                                         <p:attrNameLst>
                                           <p:attrName>style.visibility</p:attrName>
@@ -5623,32 +4807,36 @@
                     </p:cTn>
                   </p:par>
                   <p:par>
-                    <p:cTn id="12" fill="hold">
+                    <p:cTn id="13" fill="hold">
                       <p:stCondLst>
                         <p:cond delay="indefinite"/>
                       </p:stCondLst>
                       <p:childTnLst>
                         <p:par>
-                          <p:cTn id="13" fill="hold">
+                          <p:cTn id="14" fill="hold">
                             <p:stCondLst>
                               <p:cond delay="0"/>
                             </p:stCondLst>
                             <p:childTnLst>
                               <p:par>
-                                <p:cTn id="14" presetID="1" presetClass="entr" presetSubtype="0" fill="hold" grpId="0" nodeType="clickEffect">
+                                <p:cTn id="15" presetID="1" presetClass="entr" presetSubtype="0" fill="hold" grpId="0" nodeType="clickEffect">
                                   <p:stCondLst>
                                     <p:cond delay="0"/>
                                   </p:stCondLst>
                                   <p:childTnLst>
                                     <p:set>
                                       <p:cBhvr>
-                                        <p:cTn id="15" dur="1" fill="hold">
+                                        <p:cTn id="16" dur="1" fill="hold">
                                           <p:stCondLst>
                                             <p:cond delay="0"/>
                                           </p:stCondLst>
                                         </p:cTn>
                                         <p:tgtEl>
-                                          <p:spTgt spid="22"/>
+                                          <p:spTgt spid="2">
+                                            <p:txEl>
+                                              <p:pRg st="3" end="3"/>
+                                            </p:txEl>
+                                          </p:spTgt>
                                         </p:tgtEl>
                                         <p:attrNameLst>
                                           <p:attrName>style.visibility</p:attrName>
@@ -5661,19 +4849,10 @@
                                   </p:childTnLst>
                                 </p:cTn>
                               </p:par>
-                            </p:childTnLst>
-                          </p:cTn>
-                        </p:par>
-                        <p:par>
-                          <p:cTn id="16" fill="hold">
-                            <p:stCondLst>
-                              <p:cond delay="0"/>
-                            </p:stCondLst>
-                            <p:childTnLst>
                               <p:par>
-                                <p:cTn id="17" presetID="1" presetClass="exit" presetSubtype="0" fill="hold" grpId="1" nodeType="afterEffect">
+                                <p:cTn id="17" presetID="1" presetClass="entr" presetSubtype="0" fill="hold" grpId="0" nodeType="withEffect">
                                   <p:stCondLst>
-                                    <p:cond delay="2000"/>
+                                    <p:cond delay="0"/>
                                   </p:stCondLst>
                                   <p:childTnLst>
                                     <p:set>
@@ -5684,43 +4863,11 @@
                                           </p:stCondLst>
                                         </p:cTn>
                                         <p:tgtEl>
-                                          <p:spTgt spid="22"/>
-                                        </p:tgtEl>
-                                        <p:attrNameLst>
-                                          <p:attrName>style.visibility</p:attrName>
-                                        </p:attrNameLst>
-                                      </p:cBhvr>
-                                      <p:to>
-                                        <p:strVal val="hidden"/>
-                                      </p:to>
-                                    </p:set>
-                                  </p:childTnLst>
-                                </p:cTn>
-                              </p:par>
-                            </p:childTnLst>
-                          </p:cTn>
-                        </p:par>
-                        <p:par>
-                          <p:cTn id="19" fill="hold">
-                            <p:stCondLst>
-                              <p:cond delay="2000"/>
-                            </p:stCondLst>
-                            <p:childTnLst>
-                              <p:par>
-                                <p:cTn id="20" presetID="1" presetClass="entr" presetSubtype="0" fill="hold" grpId="0" nodeType="afterEffect">
-                                  <p:stCondLst>
-                                    <p:cond delay="0"/>
-                                  </p:stCondLst>
-                                  <p:childTnLst>
-                                    <p:set>
-                                      <p:cBhvr>
-                                        <p:cTn id="21" dur="1" fill="hold">
-                                          <p:stCondLst>
-                                            <p:cond delay="0"/>
-                                          </p:stCondLst>
-                                        </p:cTn>
-                                        <p:tgtEl>
-                                          <p:spTgt spid="28"/>
+                                          <p:spTgt spid="2">
+                                            <p:txEl>
+                                              <p:pRg st="4" end="4"/>
+                                            </p:txEl>
+                                          </p:spTgt>
                                         </p:tgtEl>
                                         <p:attrNameLst>
                                           <p:attrName>style.visibility</p:attrName>
@@ -5733,19 +4880,72 @@
                                   </p:childTnLst>
                                 </p:cTn>
                               </p:par>
-                            </p:childTnLst>
-                          </p:cTn>
-                        </p:par>
-                        <p:par>
-                          <p:cTn id="22" fill="hold">
-                            <p:stCondLst>
-                              <p:cond delay="2000"/>
-                            </p:stCondLst>
-                            <p:childTnLst>
                               <p:par>
-                                <p:cTn id="23" presetID="1" presetClass="exit" presetSubtype="0" fill="hold" grpId="1" nodeType="afterEffect">
+                                <p:cTn id="19" presetID="1" presetClass="entr" presetSubtype="0" fill="hold" grpId="0" nodeType="withEffect">
                                   <p:stCondLst>
-                                    <p:cond delay="1400"/>
+                                    <p:cond delay="0"/>
+                                  </p:stCondLst>
+                                  <p:childTnLst>
+                                    <p:set>
+                                      <p:cBhvr>
+                                        <p:cTn id="20" dur="1" fill="hold">
+                                          <p:stCondLst>
+                                            <p:cond delay="0"/>
+                                          </p:stCondLst>
+                                        </p:cTn>
+                                        <p:tgtEl>
+                                          <p:spTgt spid="2">
+                                            <p:txEl>
+                                              <p:pRg st="5" end="5"/>
+                                            </p:txEl>
+                                          </p:spTgt>
+                                        </p:tgtEl>
+                                        <p:attrNameLst>
+                                          <p:attrName>style.visibility</p:attrName>
+                                        </p:attrNameLst>
+                                      </p:cBhvr>
+                                      <p:to>
+                                        <p:strVal val="visible"/>
+                                      </p:to>
+                                    </p:set>
+                                  </p:childTnLst>
+                                </p:cTn>
+                              </p:par>
+                              <p:par>
+                                <p:cTn id="21" presetID="1" presetClass="entr" presetSubtype="0" fill="hold" grpId="0" nodeType="withEffect">
+                                  <p:stCondLst>
+                                    <p:cond delay="0"/>
+                                  </p:stCondLst>
+                                  <p:childTnLst>
+                                    <p:set>
+                                      <p:cBhvr>
+                                        <p:cTn id="22" dur="1" fill="hold">
+                                          <p:stCondLst>
+                                            <p:cond delay="0"/>
+                                          </p:stCondLst>
+                                        </p:cTn>
+                                        <p:tgtEl>
+                                          <p:spTgt spid="2">
+                                            <p:txEl>
+                                              <p:pRg st="6" end="6"/>
+                                            </p:txEl>
+                                          </p:spTgt>
+                                        </p:tgtEl>
+                                        <p:attrNameLst>
+                                          <p:attrName>style.visibility</p:attrName>
+                                        </p:attrNameLst>
+                                      </p:cBhvr>
+                                      <p:to>
+                                        <p:strVal val="visible"/>
+                                      </p:to>
+                                    </p:set>
+                                  </p:childTnLst>
+                                </p:cTn>
+                              </p:par>
+                              <p:par>
+                                <p:cTn id="23" presetID="1" presetClass="entr" presetSubtype="0" fill="hold" grpId="0" nodeType="withEffect">
+                                  <p:stCondLst>
+                                    <p:cond delay="0"/>
                                   </p:stCondLst>
                                   <p:childTnLst>
                                     <p:set>
@@ -5756,43 +4956,7 @@
                                           </p:stCondLst>
                                         </p:cTn>
                                         <p:tgtEl>
-                                          <p:spTgt spid="28"/>
-                                        </p:tgtEl>
-                                        <p:attrNameLst>
-                                          <p:attrName>style.visibility</p:attrName>
-                                        </p:attrNameLst>
-                                      </p:cBhvr>
-                                      <p:to>
-                                        <p:strVal val="hidden"/>
-                                      </p:to>
-                                    </p:set>
-                                  </p:childTnLst>
-                                </p:cTn>
-                              </p:par>
-                            </p:childTnLst>
-                          </p:cTn>
-                        </p:par>
-                        <p:par>
-                          <p:cTn id="25" fill="hold">
-                            <p:stCondLst>
-                              <p:cond delay="3400"/>
-                            </p:stCondLst>
-                            <p:childTnLst>
-                              <p:par>
-                                <p:cTn id="26" presetID="1" presetClass="entr" presetSubtype="0" fill="hold" grpId="0" nodeType="afterEffect">
-                                  <p:stCondLst>
-                                    <p:cond delay="0"/>
-                                  </p:stCondLst>
-                                  <p:childTnLst>
-                                    <p:set>
-                                      <p:cBhvr>
-                                        <p:cTn id="27" dur="1" fill="hold">
-                                          <p:stCondLst>
-                                            <p:cond delay="0"/>
-                                          </p:stCondLst>
-                                        </p:cTn>
-                                        <p:tgtEl>
-                                          <p:spTgt spid="27"/>
+                                          <p:spTgt spid="8"/>
                                         </p:tgtEl>
                                         <p:attrNameLst>
                                           <p:attrName>style.visibility</p:attrName>
@@ -5812,32 +4976,298 @@
                     </p:cTn>
                   </p:par>
                   <p:par>
-                    <p:cTn id="28" fill="hold">
+                    <p:cTn id="25" fill="hold">
                       <p:stCondLst>
                         <p:cond delay="indefinite"/>
                       </p:stCondLst>
                       <p:childTnLst>
                         <p:par>
-                          <p:cTn id="29" fill="hold">
+                          <p:cTn id="26" fill="hold">
                             <p:stCondLst>
                               <p:cond delay="0"/>
                             </p:stCondLst>
                             <p:childTnLst>
                               <p:par>
-                                <p:cTn id="30" presetID="1" presetClass="entr" presetSubtype="0" fill="hold" nodeType="clickEffect">
+                                <p:cTn id="27" presetID="1" presetClass="entr" presetSubtype="0" fill="hold" grpId="0" nodeType="clickEffect">
                                   <p:stCondLst>
                                     <p:cond delay="0"/>
                                   </p:stCondLst>
                                   <p:childTnLst>
                                     <p:set>
                                       <p:cBhvr>
-                                        <p:cTn id="31" dur="1" fill="hold">
+                                        <p:cTn id="28" dur="1" fill="hold">
                                           <p:stCondLst>
                                             <p:cond delay="0"/>
                                           </p:stCondLst>
                                         </p:cTn>
                                         <p:tgtEl>
-                                          <p:spTgt spid="17"/>
+                                          <p:spTgt spid="2">
+                                            <p:txEl>
+                                              <p:pRg st="7" end="7"/>
+                                            </p:txEl>
+                                          </p:spTgt>
+                                        </p:tgtEl>
+                                        <p:attrNameLst>
+                                          <p:attrName>style.visibility</p:attrName>
+                                        </p:attrNameLst>
+                                      </p:cBhvr>
+                                      <p:to>
+                                        <p:strVal val="visible"/>
+                                      </p:to>
+                                    </p:set>
+                                  </p:childTnLst>
+                                </p:cTn>
+                              </p:par>
+                              <p:par>
+                                <p:cTn id="29" presetID="1" presetClass="entr" presetSubtype="0" fill="hold" grpId="0" nodeType="withEffect">
+                                  <p:stCondLst>
+                                    <p:cond delay="0"/>
+                                  </p:stCondLst>
+                                  <p:childTnLst>
+                                    <p:set>
+                                      <p:cBhvr>
+                                        <p:cTn id="30" dur="1" fill="hold">
+                                          <p:stCondLst>
+                                            <p:cond delay="0"/>
+                                          </p:stCondLst>
+                                        </p:cTn>
+                                        <p:tgtEl>
+                                          <p:spTgt spid="9"/>
+                                        </p:tgtEl>
+                                        <p:attrNameLst>
+                                          <p:attrName>style.visibility</p:attrName>
+                                        </p:attrNameLst>
+                                      </p:cBhvr>
+                                      <p:to>
+                                        <p:strVal val="visible"/>
+                                      </p:to>
+                                    </p:set>
+                                  </p:childTnLst>
+                                </p:cTn>
+                              </p:par>
+                            </p:childTnLst>
+                          </p:cTn>
+                        </p:par>
+                      </p:childTnLst>
+                    </p:cTn>
+                  </p:par>
+                  <p:par>
+                    <p:cTn id="31" fill="hold">
+                      <p:stCondLst>
+                        <p:cond delay="indefinite"/>
+                      </p:stCondLst>
+                      <p:childTnLst>
+                        <p:par>
+                          <p:cTn id="32" fill="hold">
+                            <p:stCondLst>
+                              <p:cond delay="0"/>
+                            </p:stCondLst>
+                            <p:childTnLst>
+                              <p:par>
+                                <p:cTn id="33" presetID="1" presetClass="entr" presetSubtype="0" fill="hold" grpId="0" nodeType="clickEffect">
+                                  <p:stCondLst>
+                                    <p:cond delay="0"/>
+                                  </p:stCondLst>
+                                  <p:childTnLst>
+                                    <p:set>
+                                      <p:cBhvr>
+                                        <p:cTn id="34" dur="1" fill="hold">
+                                          <p:stCondLst>
+                                            <p:cond delay="0"/>
+                                          </p:stCondLst>
+                                        </p:cTn>
+                                        <p:tgtEl>
+                                          <p:spTgt spid="12">
+                                            <p:txEl>
+                                              <p:pRg st="0" end="0"/>
+                                            </p:txEl>
+                                          </p:spTgt>
+                                        </p:tgtEl>
+                                        <p:attrNameLst>
+                                          <p:attrName>style.visibility</p:attrName>
+                                        </p:attrNameLst>
+                                      </p:cBhvr>
+                                      <p:to>
+                                        <p:strVal val="visible"/>
+                                      </p:to>
+                                    </p:set>
+                                  </p:childTnLst>
+                                </p:cTn>
+                              </p:par>
+                              <p:par>
+                                <p:cTn id="35" presetID="1" presetClass="entr" presetSubtype="0" fill="hold" grpId="0" nodeType="withEffect">
+                                  <p:stCondLst>
+                                    <p:cond delay="0"/>
+                                  </p:stCondLst>
+                                  <p:childTnLst>
+                                    <p:set>
+                                      <p:cBhvr>
+                                        <p:cTn id="36" dur="1" fill="hold">
+                                          <p:stCondLst>
+                                            <p:cond delay="0"/>
+                                          </p:stCondLst>
+                                        </p:cTn>
+                                        <p:tgtEl>
+                                          <p:spTgt spid="12">
+                                            <p:txEl>
+                                              <p:pRg st="1" end="1"/>
+                                            </p:txEl>
+                                          </p:spTgt>
+                                        </p:tgtEl>
+                                        <p:attrNameLst>
+                                          <p:attrName>style.visibility</p:attrName>
+                                        </p:attrNameLst>
+                                      </p:cBhvr>
+                                      <p:to>
+                                        <p:strVal val="visible"/>
+                                      </p:to>
+                                    </p:set>
+                                  </p:childTnLst>
+                                </p:cTn>
+                              </p:par>
+                              <p:par>
+                                <p:cTn id="37" presetID="1" presetClass="entr" presetSubtype="0" fill="hold" grpId="0" nodeType="withEffect">
+                                  <p:stCondLst>
+                                    <p:cond delay="0"/>
+                                  </p:stCondLst>
+                                  <p:childTnLst>
+                                    <p:set>
+                                      <p:cBhvr>
+                                        <p:cTn id="38" dur="1" fill="hold">
+                                          <p:stCondLst>
+                                            <p:cond delay="0"/>
+                                          </p:stCondLst>
+                                        </p:cTn>
+                                        <p:tgtEl>
+                                          <p:spTgt spid="12">
+                                            <p:txEl>
+                                              <p:pRg st="2" end="2"/>
+                                            </p:txEl>
+                                          </p:spTgt>
+                                        </p:tgtEl>
+                                        <p:attrNameLst>
+                                          <p:attrName>style.visibility</p:attrName>
+                                        </p:attrNameLst>
+                                      </p:cBhvr>
+                                      <p:to>
+                                        <p:strVal val="visible"/>
+                                      </p:to>
+                                    </p:set>
+                                  </p:childTnLst>
+                                </p:cTn>
+                              </p:par>
+                              <p:par>
+                                <p:cTn id="39" presetID="1" presetClass="entr" presetSubtype="0" fill="hold" grpId="0" nodeType="withEffect">
+                                  <p:stCondLst>
+                                    <p:cond delay="0"/>
+                                  </p:stCondLst>
+                                  <p:childTnLst>
+                                    <p:set>
+                                      <p:cBhvr>
+                                        <p:cTn id="40" dur="1" fill="hold">
+                                          <p:stCondLst>
+                                            <p:cond delay="0"/>
+                                          </p:stCondLst>
+                                        </p:cTn>
+                                        <p:tgtEl>
+                                          <p:spTgt spid="12">
+                                            <p:txEl>
+                                              <p:pRg st="3" end="3"/>
+                                            </p:txEl>
+                                          </p:spTgt>
+                                        </p:tgtEl>
+                                        <p:attrNameLst>
+                                          <p:attrName>style.visibility</p:attrName>
+                                        </p:attrNameLst>
+                                      </p:cBhvr>
+                                      <p:to>
+                                        <p:strVal val="visible"/>
+                                      </p:to>
+                                    </p:set>
+                                  </p:childTnLst>
+                                </p:cTn>
+                              </p:par>
+                              <p:par>
+                                <p:cTn id="41" presetID="1" presetClass="entr" presetSubtype="0" fill="hold" grpId="0" nodeType="withEffect">
+                                  <p:stCondLst>
+                                    <p:cond delay="0"/>
+                                  </p:stCondLst>
+                                  <p:childTnLst>
+                                    <p:set>
+                                      <p:cBhvr>
+                                        <p:cTn id="42" dur="1" fill="hold">
+                                          <p:stCondLst>
+                                            <p:cond delay="0"/>
+                                          </p:stCondLst>
+                                        </p:cTn>
+                                        <p:tgtEl>
+                                          <p:spTgt spid="12">
+                                            <p:txEl>
+                                              <p:pRg st="4" end="4"/>
+                                            </p:txEl>
+                                          </p:spTgt>
+                                        </p:tgtEl>
+                                        <p:attrNameLst>
+                                          <p:attrName>style.visibility</p:attrName>
+                                        </p:attrNameLst>
+                                      </p:cBhvr>
+                                      <p:to>
+                                        <p:strVal val="visible"/>
+                                      </p:to>
+                                    </p:set>
+                                  </p:childTnLst>
+                                </p:cTn>
+                              </p:par>
+                              <p:par>
+                                <p:cTn id="43" presetID="1" presetClass="entr" presetSubtype="0" fill="hold" grpId="0" nodeType="withEffect">
+                                  <p:stCondLst>
+                                    <p:cond delay="0"/>
+                                  </p:stCondLst>
+                                  <p:childTnLst>
+                                    <p:set>
+                                      <p:cBhvr>
+                                        <p:cTn id="44" dur="1" fill="hold">
+                                          <p:stCondLst>
+                                            <p:cond delay="0"/>
+                                          </p:stCondLst>
+                                        </p:cTn>
+                                        <p:tgtEl>
+                                          <p:spTgt spid="12">
+                                            <p:txEl>
+                                              <p:pRg st="5" end="5"/>
+                                            </p:txEl>
+                                          </p:spTgt>
+                                        </p:tgtEl>
+                                        <p:attrNameLst>
+                                          <p:attrName>style.visibility</p:attrName>
+                                        </p:attrNameLst>
+                                      </p:cBhvr>
+                                      <p:to>
+                                        <p:strVal val="visible"/>
+                                      </p:to>
+                                    </p:set>
+                                  </p:childTnLst>
+                                </p:cTn>
+                              </p:par>
+                              <p:par>
+                                <p:cTn id="45" presetID="1" presetClass="entr" presetSubtype="0" fill="hold" grpId="0" nodeType="withEffect">
+                                  <p:stCondLst>
+                                    <p:cond delay="0"/>
+                                  </p:stCondLst>
+                                  <p:childTnLst>
+                                    <p:set>
+                                      <p:cBhvr>
+                                        <p:cTn id="46" dur="1" fill="hold">
+                                          <p:stCondLst>
+                                            <p:cond delay="0"/>
+                                          </p:stCondLst>
+                                        </p:cTn>
+                                        <p:tgtEl>
+                                          <p:spTgt spid="12">
+                                            <p:txEl>
+                                              <p:pRg st="6" end="6"/>
+                                            </p:txEl>
+                                          </p:spTgt>
                                         </p:tgtEl>
                                         <p:attrNameLst>
                                           <p:attrName>style.visibility</p:attrName>
@@ -5878,15 +5308,274 @@
       </p:par>
     </p:tnLst>
     <p:bldLst>
-      <p:bldP spid="20" grpId="0"/>
-      <p:bldP spid="21" grpId="0"/>
-      <p:bldP spid="22" grpId="0" animBg="1"/>
-      <p:bldP spid="22" grpId="1" animBg="1"/>
-      <p:bldP spid="27" grpId="0" animBg="1"/>
-      <p:bldP spid="28" grpId="0" animBg="1"/>
-      <p:bldP spid="28" grpId="1" animBg="1"/>
+      <p:bldP spid="2" grpId="0" uiExpand="1" build="p"/>
+      <p:bldP spid="7" grpId="0"/>
+      <p:bldP spid="8" grpId="0"/>
+      <p:bldP spid="9" grpId="0" animBg="1"/>
+      <p:bldP spid="12" grpId="0" uiExpand="1" build="p"/>
     </p:bldLst>
   </p:timing>
+</p:sld>
+</file>
+
+<file path=ppt/slides/slide7.xml><?xml version="1.0" encoding="utf-8"?>
+<p:sld xmlns:a="http://schemas.openxmlformats.org/drawingml/2006/main" xmlns:r="http://schemas.openxmlformats.org/officeDocument/2006/relationships" xmlns:p="http://schemas.openxmlformats.org/presentationml/2006/main">
+  <p:cSld>
+    <p:spTree>
+      <p:nvGrpSpPr>
+        <p:cNvPr id="1" name=""/>
+        <p:cNvGrpSpPr/>
+        <p:nvPr/>
+      </p:nvGrpSpPr>
+      <p:grpSpPr>
+        <a:xfrm>
+          <a:off x="0" y="0"/>
+          <a:ext cx="0" cy="0"/>
+          <a:chOff x="0" y="0"/>
+          <a:chExt cx="0" cy="0"/>
+        </a:xfrm>
+      </p:grpSpPr>
+      <p:sp>
+        <p:nvSpPr>
+          <p:cNvPr id="2" name="Inhaltsplatzhalter 1">
+            <a:extLst>
+              <a:ext uri="{FF2B5EF4-FFF2-40B4-BE49-F238E27FC236}">
+                <a16:creationId xmlns:a16="http://schemas.microsoft.com/office/drawing/2014/main" id="{1E1C0051-724B-411C-BDD1-215A1E1A54D7}"/>
+              </a:ext>
+            </a:extLst>
+          </p:cNvPr>
+          <p:cNvSpPr>
+            <a:spLocks noGrp="1"/>
+          </p:cNvSpPr>
+          <p:nvPr>
+            <p:ph idx="1"/>
+          </p:nvPr>
+        </p:nvSpPr>
+        <p:spPr/>
+        <p:txBody>
+          <a:bodyPr/>
+          <a:lstStyle/>
+          <a:p>
+            <a:r>
+              <a:rPr lang="de-DE" dirty="0" err="1"/>
+              <a:t>Only</a:t>
+            </a:r>
+            <a:r>
+              <a:rPr lang="de-DE" dirty="0"/>
+              <a:t> Right-</a:t>
+            </a:r>
+            <a:r>
+              <a:rPr lang="de-DE" dirty="0" err="1"/>
+              <a:t>handed</a:t>
+            </a:r>
+            <a:r>
+              <a:rPr lang="de-DE" dirty="0"/>
+              <a:t>, not </a:t>
+            </a:r>
+            <a:r>
+              <a:rPr lang="de-DE" dirty="0" err="1"/>
+              <a:t>movement</a:t>
+            </a:r>
+            <a:r>
+              <a:rPr lang="de-DE" dirty="0"/>
+              <a:t> </a:t>
+            </a:r>
+            <a:r>
+              <a:rPr lang="de-DE" dirty="0" err="1"/>
+              <a:t>impaired</a:t>
+            </a:r>
+            <a:endParaRPr lang="de-DE" dirty="0"/>
+          </a:p>
+          <a:p>
+            <a:r>
+              <a:rPr lang="de-DE" dirty="0" err="1"/>
+              <a:t>Two-handed</a:t>
+            </a:r>
+            <a:r>
+              <a:rPr lang="de-DE" dirty="0"/>
+              <a:t> </a:t>
+            </a:r>
+            <a:r>
+              <a:rPr lang="de-DE" dirty="0" err="1"/>
+              <a:t>interaction</a:t>
+            </a:r>
+            <a:r>
+              <a:rPr lang="de-DE" dirty="0"/>
+              <a:t> </a:t>
+            </a:r>
+            <a:r>
+              <a:rPr lang="de-DE" dirty="0" err="1"/>
+              <a:t>only</a:t>
+            </a:r>
+            <a:endParaRPr lang="de-DE" dirty="0"/>
+          </a:p>
+          <a:p>
+            <a:r>
+              <a:rPr lang="de-DE" dirty="0"/>
+              <a:t>100 </a:t>
+            </a:r>
+            <a:r>
+              <a:rPr lang="de-DE" dirty="0" err="1"/>
+              <a:t>target</a:t>
+            </a:r>
+            <a:r>
+              <a:rPr lang="de-DE" dirty="0"/>
+              <a:t> </a:t>
+            </a:r>
+            <a:r>
+              <a:rPr lang="de-DE" dirty="0" err="1"/>
+              <a:t>selection</a:t>
+            </a:r>
+            <a:r>
+              <a:rPr lang="de-DE" dirty="0"/>
+              <a:t> per </a:t>
+            </a:r>
+            <a:r>
+              <a:rPr lang="de-DE" dirty="0" err="1"/>
+              <a:t>condition</a:t>
+            </a:r>
+            <a:r>
+              <a:rPr lang="de-DE" dirty="0"/>
+              <a:t> (6 </a:t>
+            </a:r>
+            <a:r>
+              <a:rPr lang="de-DE" dirty="0" err="1"/>
+              <a:t>conditions</a:t>
+            </a:r>
+            <a:r>
+              <a:rPr lang="de-DE" dirty="0"/>
+              <a:t>)</a:t>
+            </a:r>
+          </a:p>
+          <a:p>
+            <a:r>
+              <a:rPr lang="de-DE" dirty="0" err="1"/>
+              <a:t>Within-Subject</a:t>
+            </a:r>
+            <a:r>
+              <a:rPr lang="de-DE" dirty="0"/>
+              <a:t> design</a:t>
+            </a:r>
+          </a:p>
+          <a:p>
+            <a:r>
+              <a:rPr lang="de-DE" dirty="0"/>
+              <a:t>~16 </a:t>
+            </a:r>
+            <a:r>
+              <a:rPr lang="de-DE" dirty="0" err="1"/>
+              <a:t>participants</a:t>
+            </a:r>
+            <a:r>
+              <a:rPr lang="de-DE" dirty="0"/>
+              <a:t> </a:t>
+            </a:r>
+          </a:p>
+          <a:p>
+            <a:r>
+              <a:rPr lang="de-DE" dirty="0"/>
+              <a:t>Study-</a:t>
+            </a:r>
+            <a:r>
+              <a:rPr lang="de-DE" dirty="0" err="1"/>
+              <a:t>length</a:t>
+            </a:r>
+            <a:r>
+              <a:rPr lang="de-DE" dirty="0"/>
+              <a:t>: 15 </a:t>
+            </a:r>
+            <a:r>
+              <a:rPr lang="de-DE" dirty="0" err="1"/>
+              <a:t>minutes</a:t>
+            </a:r>
+            <a:endParaRPr lang="de-DE" dirty="0"/>
+          </a:p>
+          <a:p>
+            <a:endParaRPr lang="de-DE" dirty="0"/>
+          </a:p>
+          <a:p>
+            <a:endParaRPr lang="de-DE" dirty="0"/>
+          </a:p>
+          <a:p>
+            <a:endParaRPr lang="de-DE" dirty="0"/>
+          </a:p>
+        </p:txBody>
+      </p:sp>
+      <p:sp>
+        <p:nvSpPr>
+          <p:cNvPr id="3" name="Foliennummernplatzhalter 2">
+            <a:extLst>
+              <a:ext uri="{FF2B5EF4-FFF2-40B4-BE49-F238E27FC236}">
+                <a16:creationId xmlns:a16="http://schemas.microsoft.com/office/drawing/2014/main" id="{8C0FD180-B4A3-4327-9EDE-F359930B83B7}"/>
+              </a:ext>
+            </a:extLst>
+          </p:cNvPr>
+          <p:cNvSpPr>
+            <a:spLocks noGrp="1"/>
+          </p:cNvSpPr>
+          <p:nvPr>
+            <p:ph type="sldNum" sz="quarter" idx="12"/>
+          </p:nvPr>
+        </p:nvSpPr>
+        <p:spPr/>
+        <p:txBody>
+          <a:bodyPr/>
+          <a:lstStyle/>
+          <a:p>
+            <a:fld id="{29AD3987-26BA-49DC-BA24-72731371DC9F}" type="slidenum">
+              <a:rPr lang="de-DE" smtClean="0"/>
+              <a:t>7</a:t>
+            </a:fld>
+            <a:endParaRPr lang="de-DE" dirty="0"/>
+          </a:p>
+        </p:txBody>
+      </p:sp>
+      <p:sp>
+        <p:nvSpPr>
+          <p:cNvPr id="4" name="Titel 3">
+            <a:extLst>
+              <a:ext uri="{FF2B5EF4-FFF2-40B4-BE49-F238E27FC236}">
+                <a16:creationId xmlns:a16="http://schemas.microsoft.com/office/drawing/2014/main" id="{BFB8DF1B-1D49-452C-9A29-879B3BB3D291}"/>
+              </a:ext>
+            </a:extLst>
+          </p:cNvPr>
+          <p:cNvSpPr>
+            <a:spLocks noGrp="1"/>
+          </p:cNvSpPr>
+          <p:nvPr>
+            <p:ph type="title"/>
+          </p:nvPr>
+        </p:nvSpPr>
+        <p:spPr/>
+        <p:txBody>
+          <a:bodyPr/>
+          <a:lstStyle/>
+          <a:p>
+            <a:r>
+              <a:rPr lang="de-DE" dirty="0"/>
+              <a:t>Project </a:t>
+            </a:r>
+            <a:r>
+              <a:rPr lang="de-DE" dirty="0" err="1"/>
+              <a:t>planning</a:t>
+            </a:r>
+            <a:r>
+              <a:rPr lang="de-DE" dirty="0"/>
+              <a:t>: Study</a:t>
+            </a:r>
+          </a:p>
+        </p:txBody>
+      </p:sp>
+    </p:spTree>
+    <p:extLst>
+      <p:ext uri="{BB962C8B-B14F-4D97-AF65-F5344CB8AC3E}">
+        <p14:creationId xmlns:p14="http://schemas.microsoft.com/office/powerpoint/2010/main" val="3080695642"/>
+      </p:ext>
+    </p:extLst>
+  </p:cSld>
+  <p:clrMapOvr>
+    <a:masterClrMapping/>
+  </p:clrMapOvr>
 </p:sld>
 </file>
 
@@ -5912,7 +5601,7 @@
           <p:cNvPr id="2" name="Inhaltsplatzhalter 1">
             <a:extLst>
               <a:ext uri="{FF2B5EF4-FFF2-40B4-BE49-F238E27FC236}">
-                <a16:creationId xmlns:a16="http://schemas.microsoft.com/office/drawing/2014/main" id="{88500AB4-5597-4578-9B71-BF9A3A0B0B3D}"/>
+                <a16:creationId xmlns:a16="http://schemas.microsoft.com/office/drawing/2014/main" id="{3E4A7660-D434-4625-A150-900328F4507B}"/>
               </a:ext>
             </a:extLst>
           </p:cNvPr>
@@ -5923,93 +5612,31 @@
             <p:ph idx="1"/>
           </p:nvPr>
         </p:nvSpPr>
-        <p:spPr>
-          <a:xfrm>
-            <a:off x="251520" y="1202574"/>
-            <a:ext cx="2910414" cy="3400026"/>
-          </a:xfrm>
-        </p:spPr>
+        <p:spPr/>
         <p:txBody>
           <a:bodyPr/>
           <a:lstStyle/>
           <a:p>
             <a:r>
               <a:rPr lang="de-DE" dirty="0"/>
-              <a:t>Input </a:t>
-            </a:r>
-            <a:r>
-              <a:rPr lang="de-DE" dirty="0" err="1"/>
-              <a:t>method</a:t>
-            </a:r>
-            <a:endParaRPr lang="de-DE" dirty="0"/>
-          </a:p>
-          <a:p>
-            <a:pPr lvl="1"/>
-            <a:r>
-              <a:rPr lang="de-DE" dirty="0"/>
-              <a:t>Finger	</a:t>
-            </a:r>
-          </a:p>
-          <a:p>
-            <a:pPr lvl="1"/>
-            <a:r>
-              <a:rPr lang="de-DE" dirty="0" err="1"/>
-              <a:t>Knuckle</a:t>
-            </a:r>
-            <a:r>
-              <a:rPr lang="de-DE" dirty="0"/>
-              <a:t>	</a:t>
-            </a:r>
-          </a:p>
-          <a:p>
-            <a:r>
-              <a:rPr lang="de-DE" dirty="0" err="1"/>
-              <a:t>Tap</a:t>
-            </a:r>
-            <a:r>
-              <a:rPr lang="de-DE" dirty="0"/>
-              <a:t> Type</a:t>
-            </a:r>
-          </a:p>
-          <a:p>
-            <a:pPr lvl="1"/>
-            <a:r>
-              <a:rPr lang="de-DE" dirty="0" err="1"/>
-              <a:t>Tap</a:t>
-            </a:r>
-            <a:r>
-              <a:rPr lang="de-DE" dirty="0"/>
-              <a:t>	</a:t>
-            </a:r>
-          </a:p>
-          <a:p>
-            <a:pPr lvl="1"/>
-            <a:r>
-              <a:rPr lang="de-DE" dirty="0"/>
-              <a:t>Double-</a:t>
-            </a:r>
-            <a:r>
-              <a:rPr lang="de-DE" dirty="0" err="1"/>
-              <a:t>Tap</a:t>
-            </a:r>
-            <a:endParaRPr lang="de-DE" dirty="0"/>
-          </a:p>
-          <a:p>
-            <a:pPr lvl="1"/>
-            <a:r>
-              <a:rPr lang="de-DE" dirty="0"/>
-              <a:t>Long-Press</a:t>
-            </a:r>
-          </a:p>
-          <a:p>
-            <a:r>
-              <a:rPr lang="de-DE" dirty="0" err="1"/>
-              <a:t>Randomized</a:t>
-            </a:r>
-            <a:r>
-              <a:rPr lang="de-DE" dirty="0"/>
-              <a:t> Targets</a:t>
-            </a:r>
+              <a:t>1 CNN </a:t>
+            </a:r>
+            <a:r>
+              <a:rPr lang="de-DE" dirty="0" err="1"/>
+              <a:t>for</a:t>
+            </a:r>
+            <a:r>
+              <a:rPr lang="de-DE" dirty="0"/>
+              <a:t> all </a:t>
+            </a:r>
+            <a:r>
+              <a:rPr lang="de-DE" dirty="0" err="1"/>
+              <a:t>data</a:t>
+            </a:r>
+            <a:endParaRPr lang="de-DE" dirty="0"/>
+          </a:p>
+          <a:p>
+            <a:endParaRPr lang="de-DE" dirty="0"/>
           </a:p>
           <a:p>
             <a:endParaRPr lang="de-DE" dirty="0"/>
@@ -6021,7 +5648,7 @@
           <p:cNvPr id="3" name="Foliennummernplatzhalter 2">
             <a:extLst>
               <a:ext uri="{FF2B5EF4-FFF2-40B4-BE49-F238E27FC236}">
-                <a16:creationId xmlns:a16="http://schemas.microsoft.com/office/drawing/2014/main" id="{FB313AD9-7B68-43BF-98FF-33E13BBA00EF}"/>
+                <a16:creationId xmlns:a16="http://schemas.microsoft.com/office/drawing/2014/main" id="{11672526-37FB-4CD3-A3FE-A70E0C29DEBB}"/>
               </a:ext>
             </a:extLst>
           </p:cNvPr>
@@ -6050,7 +5677,7 @@
           <p:cNvPr id="4" name="Titel 3">
             <a:extLst>
               <a:ext uri="{FF2B5EF4-FFF2-40B4-BE49-F238E27FC236}">
-                <a16:creationId xmlns:a16="http://schemas.microsoft.com/office/drawing/2014/main" id="{50E097EA-1F25-4894-A7D9-C82CDC128444}"/>
+                <a16:creationId xmlns:a16="http://schemas.microsoft.com/office/drawing/2014/main" id="{CDF3721F-581E-4D0C-87D6-6590FCD81F7C}"/>
               </a:ext>
             </a:extLst>
           </p:cNvPr>
@@ -6076,1158 +5703,26 @@
             </a:r>
             <a:r>
               <a:rPr lang="de-DE" dirty="0"/>
-              <a:t>: Android-App</a:t>
-            </a:r>
-          </a:p>
-        </p:txBody>
-      </p:sp>
-      <p:graphicFrame>
-        <p:nvGraphicFramePr>
-          <p:cNvPr id="5" name="Tabelle 4">
-            <a:extLst>
-              <a:ext uri="{FF2B5EF4-FFF2-40B4-BE49-F238E27FC236}">
-                <a16:creationId xmlns:a16="http://schemas.microsoft.com/office/drawing/2014/main" id="{32D76C5D-0E44-47C2-BC51-ABC00C12887B}"/>
-              </a:ext>
-            </a:extLst>
-          </p:cNvPr>
-          <p:cNvGraphicFramePr>
-            <a:graphicFrameLocks noGrp="1"/>
-          </p:cNvGraphicFramePr>
-          <p:nvPr>
-            <p:extLst>
-              <p:ext uri="{D42A27DB-BD31-4B8C-83A1-F6EECF244321}">
-                <p14:modId xmlns:p14="http://schemas.microsoft.com/office/powerpoint/2010/main" val="3910286280"/>
-              </p:ext>
-            </p:extLst>
-          </p:nvPr>
-        </p:nvGraphicFramePr>
-        <p:xfrm>
-          <a:off x="6459018" y="1137215"/>
-          <a:ext cx="2056192" cy="3820929"/>
-        </p:xfrm>
-        <a:graphic>
-          <a:graphicData uri="http://schemas.openxmlformats.org/drawingml/2006/table">
-            <a:tbl>
-              <a:tblPr firstRow="1" bandRow="1">
-                <a:tableStyleId>{6E25E649-3F16-4E02-A733-19D2CDBF48F0}</a:tableStyleId>
-              </a:tblPr>
-              <a:tblGrid>
-                <a:gridCol w="2056192">
-                  <a:extLst>
-                    <a:ext uri="{9D8B030D-6E8A-4147-A177-3AD203B41FA5}">
-                      <a16:colId xmlns:a16="http://schemas.microsoft.com/office/drawing/2014/main" val="724543574"/>
-                    </a:ext>
-                  </a:extLst>
-                </a:gridCol>
-              </a:tblGrid>
-              <a:tr h="545847">
-                <a:tc>
-                  <a:txBody>
-                    <a:bodyPr/>
-                    <a:lstStyle/>
-                    <a:p>
-                      <a:r>
-                        <a:rPr lang="de-DE" dirty="0" err="1"/>
-                        <a:t>Collected</a:t>
-                      </a:r>
-                      <a:r>
-                        <a:rPr lang="de-DE" dirty="0"/>
-                        <a:t> </a:t>
-                      </a:r>
-                      <a:r>
-                        <a:rPr lang="de-DE" dirty="0" err="1"/>
-                        <a:t>data</a:t>
-                      </a:r>
-                      <a:endParaRPr lang="de-DE" dirty="0"/>
-                    </a:p>
-                  </a:txBody>
-                  <a:tcPr>
-                    <a:lnL w="12700" cap="flat" cmpd="sng" algn="ctr">
-                      <a:solidFill>
-                        <a:schemeClr val="tx1"/>
-                      </a:solidFill>
-                      <a:prstDash val="solid"/>
-                      <a:round/>
-                      <a:headEnd type="none" w="med" len="med"/>
-                      <a:tailEnd type="none" w="med" len="med"/>
-                    </a:lnL>
-                    <a:lnR w="12700" cap="flat" cmpd="sng" algn="ctr">
-                      <a:solidFill>
-                        <a:schemeClr val="tx1"/>
-                      </a:solidFill>
-                      <a:prstDash val="solid"/>
-                      <a:round/>
-                      <a:headEnd type="none" w="med" len="med"/>
-                      <a:tailEnd type="none" w="med" len="med"/>
-                    </a:lnR>
-                    <a:lnT w="12700" cap="flat" cmpd="sng" algn="ctr">
-                      <a:solidFill>
-                        <a:schemeClr val="tx1"/>
-                      </a:solidFill>
-                      <a:prstDash val="solid"/>
-                      <a:round/>
-                      <a:headEnd type="none" w="med" len="med"/>
-                      <a:tailEnd type="none" w="med" len="med"/>
-                    </a:lnT>
-                    <a:lnB w="12700" cap="flat" cmpd="sng" algn="ctr">
-                      <a:noFill/>
-                      <a:prstDash val="solid"/>
-                      <a:round/>
-                      <a:headEnd type="none" w="med" len="med"/>
-                      <a:tailEnd type="none" w="med" len="med"/>
-                    </a:lnB>
-                    <a:lnTlToBr w="12700" cmpd="sng">
-                      <a:noFill/>
-                      <a:prstDash val="solid"/>
-                    </a:lnTlToBr>
-                    <a:lnBlToTr w="12700" cmpd="sng">
-                      <a:noFill/>
-                      <a:prstDash val="solid"/>
-                    </a:lnBlToTr>
-                  </a:tcPr>
-                </a:tc>
-                <a:extLst>
-                  <a:ext uri="{0D108BD9-81ED-4DB2-BD59-A6C34878D82A}">
-                    <a16:rowId xmlns:a16="http://schemas.microsoft.com/office/drawing/2014/main" val="4090562286"/>
-                  </a:ext>
-                </a:extLst>
-              </a:tr>
-              <a:tr h="545847">
-                <a:tc>
-                  <a:txBody>
-                    <a:bodyPr/>
-                    <a:lstStyle/>
-                    <a:p>
-                      <a:r>
-                        <a:rPr lang="de-DE" dirty="0" err="1"/>
-                        <a:t>UserID</a:t>
-                      </a:r>
-                      <a:endParaRPr lang="de-DE" dirty="0"/>
-                    </a:p>
-                  </a:txBody>
-                  <a:tcPr>
-                    <a:lnL w="12700" cap="flat" cmpd="sng" algn="ctr">
-                      <a:solidFill>
-                        <a:schemeClr val="tx1"/>
-                      </a:solidFill>
-                      <a:prstDash val="solid"/>
-                      <a:round/>
-                      <a:headEnd type="none" w="med" len="med"/>
-                      <a:tailEnd type="none" w="med" len="med"/>
-                    </a:lnL>
-                    <a:lnR w="12700" cap="flat" cmpd="sng" algn="ctr">
-                      <a:solidFill>
-                        <a:schemeClr val="tx1"/>
-                      </a:solidFill>
-                      <a:prstDash val="solid"/>
-                      <a:round/>
-                      <a:headEnd type="none" w="med" len="med"/>
-                      <a:tailEnd type="none" w="med" len="med"/>
-                    </a:lnR>
-                    <a:lnT w="12700" cap="flat" cmpd="sng" algn="ctr">
-                      <a:noFill/>
-                      <a:prstDash val="solid"/>
-                      <a:round/>
-                      <a:headEnd type="none" w="med" len="med"/>
-                      <a:tailEnd type="none" w="med" len="med"/>
-                    </a:lnT>
-                    <a:lnB w="12700" cap="flat" cmpd="sng" algn="ctr">
-                      <a:noFill/>
-                      <a:prstDash val="solid"/>
-                      <a:round/>
-                      <a:headEnd type="none" w="med" len="med"/>
-                      <a:tailEnd type="none" w="med" len="med"/>
-                    </a:lnB>
-                    <a:lnTlToBr w="12700" cmpd="sng">
-                      <a:noFill/>
-                      <a:prstDash val="solid"/>
-                    </a:lnTlToBr>
-                    <a:lnBlToTr w="12700" cmpd="sng">
-                      <a:noFill/>
-                      <a:prstDash val="solid"/>
-                    </a:lnBlToTr>
-                  </a:tcPr>
-                </a:tc>
-                <a:extLst>
-                  <a:ext uri="{0D108BD9-81ED-4DB2-BD59-A6C34878D82A}">
-                    <a16:rowId xmlns:a16="http://schemas.microsoft.com/office/drawing/2014/main" val="3417067981"/>
-                  </a:ext>
-                </a:extLst>
-              </a:tr>
-              <a:tr h="545847">
-                <a:tc>
-                  <a:txBody>
-                    <a:bodyPr/>
-                    <a:lstStyle/>
-                    <a:p>
-                      <a:r>
-                        <a:rPr lang="de-DE" dirty="0" err="1"/>
-                        <a:t>Timestamp</a:t>
-                      </a:r>
-                      <a:endParaRPr lang="de-DE" dirty="0"/>
-                    </a:p>
-                  </a:txBody>
-                  <a:tcPr>
-                    <a:lnL w="12700" cap="flat" cmpd="sng" algn="ctr">
-                      <a:solidFill>
-                        <a:schemeClr val="tx1"/>
-                      </a:solidFill>
-                      <a:prstDash val="solid"/>
-                      <a:round/>
-                      <a:headEnd type="none" w="med" len="med"/>
-                      <a:tailEnd type="none" w="med" len="med"/>
-                    </a:lnL>
-                    <a:lnR w="12700" cap="flat" cmpd="sng" algn="ctr">
-                      <a:solidFill>
-                        <a:schemeClr val="tx1"/>
-                      </a:solidFill>
-                      <a:prstDash val="solid"/>
-                      <a:round/>
-                      <a:headEnd type="none" w="med" len="med"/>
-                      <a:tailEnd type="none" w="med" len="med"/>
-                    </a:lnR>
-                    <a:lnT w="12700" cap="flat" cmpd="sng" algn="ctr">
-                      <a:noFill/>
-                      <a:prstDash val="solid"/>
-                      <a:round/>
-                      <a:headEnd type="none" w="med" len="med"/>
-                      <a:tailEnd type="none" w="med" len="med"/>
-                    </a:lnT>
-                    <a:lnB w="12700" cap="flat" cmpd="sng" algn="ctr">
-                      <a:noFill/>
-                      <a:prstDash val="solid"/>
-                      <a:round/>
-                      <a:headEnd type="none" w="med" len="med"/>
-                      <a:tailEnd type="none" w="med" len="med"/>
-                    </a:lnB>
-                    <a:lnTlToBr w="12700" cmpd="sng">
-                      <a:noFill/>
-                      <a:prstDash val="solid"/>
-                    </a:lnTlToBr>
-                    <a:lnBlToTr w="12700" cmpd="sng">
-                      <a:noFill/>
-                      <a:prstDash val="solid"/>
-                    </a:lnBlToTr>
-                  </a:tcPr>
-                </a:tc>
-                <a:extLst>
-                  <a:ext uri="{0D108BD9-81ED-4DB2-BD59-A6C34878D82A}">
-                    <a16:rowId xmlns:a16="http://schemas.microsoft.com/office/drawing/2014/main" val="263320400"/>
-                  </a:ext>
-                </a:extLst>
-              </a:tr>
-              <a:tr h="545847">
-                <a:tc>
-                  <a:txBody>
-                    <a:bodyPr/>
-                    <a:lstStyle/>
-                    <a:p>
-                      <a:r>
-                        <a:rPr lang="de-DE" dirty="0" err="1"/>
-                        <a:t>TargetID</a:t>
-                      </a:r>
-                      <a:endParaRPr lang="de-DE" dirty="0"/>
-                    </a:p>
-                  </a:txBody>
-                  <a:tcPr>
-                    <a:lnL w="12700" cap="flat" cmpd="sng" algn="ctr">
-                      <a:solidFill>
-                        <a:schemeClr val="tx1"/>
-                      </a:solidFill>
-                      <a:prstDash val="solid"/>
-                      <a:round/>
-                      <a:headEnd type="none" w="med" len="med"/>
-                      <a:tailEnd type="none" w="med" len="med"/>
-                    </a:lnL>
-                    <a:lnR w="12700" cap="flat" cmpd="sng" algn="ctr">
-                      <a:solidFill>
-                        <a:schemeClr val="tx1"/>
-                      </a:solidFill>
-                      <a:prstDash val="solid"/>
-                      <a:round/>
-                      <a:headEnd type="none" w="med" len="med"/>
-                      <a:tailEnd type="none" w="med" len="med"/>
-                    </a:lnR>
-                    <a:lnT w="12700" cap="flat" cmpd="sng" algn="ctr">
-                      <a:noFill/>
-                      <a:prstDash val="solid"/>
-                      <a:round/>
-                      <a:headEnd type="none" w="med" len="med"/>
-                      <a:tailEnd type="none" w="med" len="med"/>
-                    </a:lnT>
-                    <a:lnB w="12700" cap="flat" cmpd="sng" algn="ctr">
-                      <a:noFill/>
-                      <a:prstDash val="solid"/>
-                      <a:round/>
-                      <a:headEnd type="none" w="med" len="med"/>
-                      <a:tailEnd type="none" w="med" len="med"/>
-                    </a:lnB>
-                    <a:lnTlToBr w="12700" cmpd="sng">
-                      <a:noFill/>
-                      <a:prstDash val="solid"/>
-                    </a:lnTlToBr>
-                    <a:lnBlToTr w="12700" cmpd="sng">
-                      <a:noFill/>
-                      <a:prstDash val="solid"/>
-                    </a:lnBlToTr>
-                  </a:tcPr>
-                </a:tc>
-                <a:extLst>
-                  <a:ext uri="{0D108BD9-81ED-4DB2-BD59-A6C34878D82A}">
-                    <a16:rowId xmlns:a16="http://schemas.microsoft.com/office/drawing/2014/main" val="972984989"/>
-                  </a:ext>
-                </a:extLst>
-              </a:tr>
-              <a:tr h="545847">
-                <a:tc>
-                  <a:txBody>
-                    <a:bodyPr/>
-                    <a:lstStyle/>
-                    <a:p>
-                      <a:r>
-                        <a:rPr lang="de-DE" dirty="0" err="1"/>
-                        <a:t>Condition</a:t>
-                      </a:r>
-                      <a:endParaRPr lang="de-DE" dirty="0"/>
-                    </a:p>
-                  </a:txBody>
-                  <a:tcPr>
-                    <a:lnL w="12700" cap="flat" cmpd="sng" algn="ctr">
-                      <a:solidFill>
-                        <a:schemeClr val="tx1"/>
-                      </a:solidFill>
-                      <a:prstDash val="solid"/>
-                      <a:round/>
-                      <a:headEnd type="none" w="med" len="med"/>
-                      <a:tailEnd type="none" w="med" len="med"/>
-                    </a:lnL>
-                    <a:lnR w="12700" cap="flat" cmpd="sng" algn="ctr">
-                      <a:solidFill>
-                        <a:schemeClr val="tx1"/>
-                      </a:solidFill>
-                      <a:prstDash val="solid"/>
-                      <a:round/>
-                      <a:headEnd type="none" w="med" len="med"/>
-                      <a:tailEnd type="none" w="med" len="med"/>
-                    </a:lnR>
-                    <a:lnT w="12700" cap="flat" cmpd="sng" algn="ctr">
-                      <a:noFill/>
-                      <a:prstDash val="solid"/>
-                      <a:round/>
-                      <a:headEnd type="none" w="med" len="med"/>
-                      <a:tailEnd type="none" w="med" len="med"/>
-                    </a:lnT>
-                    <a:lnB w="12700" cap="flat" cmpd="sng" algn="ctr">
-                      <a:noFill/>
-                      <a:prstDash val="solid"/>
-                      <a:round/>
-                      <a:headEnd type="none" w="med" len="med"/>
-                      <a:tailEnd type="none" w="med" len="med"/>
-                    </a:lnB>
-                    <a:lnTlToBr w="12700" cmpd="sng">
-                      <a:noFill/>
-                      <a:prstDash val="solid"/>
-                    </a:lnTlToBr>
-                    <a:lnBlToTr w="12700" cmpd="sng">
-                      <a:noFill/>
-                      <a:prstDash val="solid"/>
-                    </a:lnBlToTr>
-                  </a:tcPr>
-                </a:tc>
-                <a:extLst>
-                  <a:ext uri="{0D108BD9-81ED-4DB2-BD59-A6C34878D82A}">
-                    <a16:rowId xmlns:a16="http://schemas.microsoft.com/office/drawing/2014/main" val="4371834"/>
-                  </a:ext>
-                </a:extLst>
-              </a:tr>
-              <a:tr h="545847">
-                <a:tc>
-                  <a:txBody>
-                    <a:bodyPr/>
-                    <a:lstStyle/>
-                    <a:p>
-                      <a:r>
-                        <a:rPr lang="de-DE" dirty="0"/>
-                        <a:t>Position</a:t>
-                      </a:r>
-                    </a:p>
-                  </a:txBody>
-                  <a:tcPr>
-                    <a:lnL w="12700" cap="flat" cmpd="sng" algn="ctr">
-                      <a:solidFill>
-                        <a:schemeClr val="tx1"/>
-                      </a:solidFill>
-                      <a:prstDash val="solid"/>
-                      <a:round/>
-                      <a:headEnd type="none" w="med" len="med"/>
-                      <a:tailEnd type="none" w="med" len="med"/>
-                    </a:lnL>
-                    <a:lnR w="12700" cap="flat" cmpd="sng" algn="ctr">
-                      <a:solidFill>
-                        <a:schemeClr val="tx1"/>
-                      </a:solidFill>
-                      <a:prstDash val="solid"/>
-                      <a:round/>
-                      <a:headEnd type="none" w="med" len="med"/>
-                      <a:tailEnd type="none" w="med" len="med"/>
-                    </a:lnR>
-                    <a:lnT w="12700" cap="flat" cmpd="sng" algn="ctr">
-                      <a:noFill/>
-                      <a:prstDash val="solid"/>
-                      <a:round/>
-                      <a:headEnd type="none" w="med" len="med"/>
-                      <a:tailEnd type="none" w="med" len="med"/>
-                    </a:lnT>
-                    <a:lnB w="12700" cap="flat" cmpd="sng" algn="ctr">
-                      <a:noFill/>
-                      <a:prstDash val="solid"/>
-                      <a:round/>
-                      <a:headEnd type="none" w="med" len="med"/>
-                      <a:tailEnd type="none" w="med" len="med"/>
-                    </a:lnB>
-                    <a:lnTlToBr w="12700" cmpd="sng">
-                      <a:noFill/>
-                      <a:prstDash val="solid"/>
-                    </a:lnTlToBr>
-                    <a:lnBlToTr w="12700" cmpd="sng">
-                      <a:noFill/>
-                      <a:prstDash val="solid"/>
-                    </a:lnBlToTr>
-                  </a:tcPr>
-                </a:tc>
-                <a:extLst>
-                  <a:ext uri="{0D108BD9-81ED-4DB2-BD59-A6C34878D82A}">
-                    <a16:rowId xmlns:a16="http://schemas.microsoft.com/office/drawing/2014/main" val="575484830"/>
-                  </a:ext>
-                </a:extLst>
-              </a:tr>
-              <a:tr h="545847">
-                <a:tc>
-                  <a:txBody>
-                    <a:bodyPr/>
-                    <a:lstStyle/>
-                    <a:p>
-                      <a:r>
-                        <a:rPr lang="de-DE" dirty="0" err="1"/>
-                        <a:t>Capacitive</a:t>
-                      </a:r>
-                      <a:r>
-                        <a:rPr lang="de-DE" dirty="0"/>
-                        <a:t> </a:t>
-                      </a:r>
-                      <a:r>
-                        <a:rPr lang="de-DE" dirty="0" err="1"/>
-                        <a:t>image</a:t>
-                      </a:r>
-                      <a:endParaRPr lang="de-DE" dirty="0"/>
-                    </a:p>
-                  </a:txBody>
-                  <a:tcPr>
-                    <a:lnL w="12700" cap="flat" cmpd="sng" algn="ctr">
-                      <a:solidFill>
-                        <a:schemeClr val="tx1"/>
-                      </a:solidFill>
-                      <a:prstDash val="solid"/>
-                      <a:round/>
-                      <a:headEnd type="none" w="med" len="med"/>
-                      <a:tailEnd type="none" w="med" len="med"/>
-                    </a:lnL>
-                    <a:lnR w="12700" cap="flat" cmpd="sng" algn="ctr">
-                      <a:solidFill>
-                        <a:schemeClr val="tx1"/>
-                      </a:solidFill>
-                      <a:prstDash val="solid"/>
-                      <a:round/>
-                      <a:headEnd type="none" w="med" len="med"/>
-                      <a:tailEnd type="none" w="med" len="med"/>
-                    </a:lnR>
-                    <a:lnT w="12700" cap="flat" cmpd="sng" algn="ctr">
-                      <a:noFill/>
-                      <a:prstDash val="solid"/>
-                      <a:round/>
-                      <a:headEnd type="none" w="med" len="med"/>
-                      <a:tailEnd type="none" w="med" len="med"/>
-                    </a:lnT>
-                    <a:lnB w="12700" cap="flat" cmpd="sng" algn="ctr">
-                      <a:solidFill>
-                        <a:schemeClr val="tx1"/>
-                      </a:solidFill>
-                      <a:prstDash val="solid"/>
-                      <a:round/>
-                      <a:headEnd type="none" w="med" len="med"/>
-                      <a:tailEnd type="none" w="med" len="med"/>
-                    </a:lnB>
-                    <a:lnTlToBr w="12700" cmpd="sng">
-                      <a:noFill/>
-                      <a:prstDash val="solid"/>
-                    </a:lnTlToBr>
-                    <a:lnBlToTr w="12700" cmpd="sng">
-                      <a:noFill/>
-                      <a:prstDash val="solid"/>
-                    </a:lnBlToTr>
-                  </a:tcPr>
-                </a:tc>
-                <a:extLst>
-                  <a:ext uri="{0D108BD9-81ED-4DB2-BD59-A6C34878D82A}">
-                    <a16:rowId xmlns:a16="http://schemas.microsoft.com/office/drawing/2014/main" val="3890628370"/>
-                  </a:ext>
-                </a:extLst>
-              </a:tr>
-            </a:tbl>
-          </a:graphicData>
-        </a:graphic>
-      </p:graphicFrame>
-      <p:pic>
-        <p:nvPicPr>
-          <p:cNvPr id="6" name="Grafik 5">
-            <a:extLst>
-              <a:ext uri="{FF2B5EF4-FFF2-40B4-BE49-F238E27FC236}">
-                <a16:creationId xmlns:a16="http://schemas.microsoft.com/office/drawing/2014/main" id="{B42814CA-1C86-4FAC-9FA2-E1A4A676B4A4}"/>
-              </a:ext>
-            </a:extLst>
-          </p:cNvPr>
-          <p:cNvPicPr>
-            <a:picLocks noChangeAspect="1"/>
-          </p:cNvPicPr>
-          <p:nvPr/>
-        </p:nvPicPr>
-        <p:blipFill rotWithShape="1">
-          <a:blip r:embed="rId2" cstate="print">
-            <a:extLst>
-              <a:ext uri="{28A0092B-C50C-407E-A947-70E740481C1C}">
-                <a14:useLocalDpi xmlns:a14="http://schemas.microsoft.com/office/drawing/2010/main" val="0"/>
-              </a:ext>
-            </a:extLst>
-          </a:blip>
-          <a:srcRect l="12194" t="7913" r="12194" b="6951"/>
-          <a:stretch/>
-        </p:blipFill>
-        <p:spPr>
-          <a:xfrm>
-            <a:off x="3779912" y="1137215"/>
-            <a:ext cx="1884938" cy="3820928"/>
-          </a:xfrm>
-          <a:prstGeom prst="rect">
-            <a:avLst/>
-          </a:prstGeom>
-        </p:spPr>
-      </p:pic>
-      <p:sp>
-        <p:nvSpPr>
-          <p:cNvPr id="7" name="Textfeld 6">
-            <a:extLst>
-              <a:ext uri="{FF2B5EF4-FFF2-40B4-BE49-F238E27FC236}">
-                <a16:creationId xmlns:a16="http://schemas.microsoft.com/office/drawing/2014/main" id="{50DB8E9A-5381-4A7B-881A-262D5DDE2BC9}"/>
-              </a:ext>
-            </a:extLst>
-          </p:cNvPr>
-          <p:cNvSpPr txBox="1"/>
-          <p:nvPr/>
-        </p:nvSpPr>
-        <p:spPr>
-          <a:xfrm>
-            <a:off x="3851920" y="1773174"/>
-            <a:ext cx="1728191" cy="400110"/>
-          </a:xfrm>
-          <a:prstGeom prst="rect">
-            <a:avLst/>
-          </a:prstGeom>
-          <a:noFill/>
-        </p:spPr>
-        <p:txBody>
-          <a:bodyPr wrap="square" rtlCol="0">
-            <a:spAutoFit/>
-          </a:bodyPr>
-          <a:lstStyle/>
-          <a:p>
-            <a:pPr algn="ctr"/>
-            <a:r>
-              <a:rPr lang="de-DE" sz="2000" dirty="0"/>
-              <a:t>Input </a:t>
-            </a:r>
-            <a:r>
-              <a:rPr lang="de-DE" sz="2000" dirty="0" err="1"/>
-              <a:t>method</a:t>
-            </a:r>
-            <a:endParaRPr lang="de-DE" sz="2000" dirty="0"/>
-          </a:p>
-        </p:txBody>
-      </p:sp>
-      <p:sp>
-        <p:nvSpPr>
-          <p:cNvPr id="8" name="Textfeld 7">
-            <a:extLst>
-              <a:ext uri="{FF2B5EF4-FFF2-40B4-BE49-F238E27FC236}">
-                <a16:creationId xmlns:a16="http://schemas.microsoft.com/office/drawing/2014/main" id="{E100F715-C300-40FB-8732-F579C176C682}"/>
-              </a:ext>
-            </a:extLst>
-          </p:cNvPr>
-          <p:cNvSpPr txBox="1"/>
-          <p:nvPr/>
-        </p:nvSpPr>
-        <p:spPr>
-          <a:xfrm>
-            <a:off x="4283968" y="2161296"/>
-            <a:ext cx="942468" cy="338554"/>
-          </a:xfrm>
-          <a:prstGeom prst="rect">
-            <a:avLst/>
-          </a:prstGeom>
-          <a:noFill/>
-        </p:spPr>
-        <p:txBody>
-          <a:bodyPr wrap="square" rtlCol="0">
-            <a:spAutoFit/>
-          </a:bodyPr>
-          <a:lstStyle/>
-          <a:p>
-            <a:pPr algn="ctr"/>
-            <a:r>
-              <a:rPr lang="de-DE" sz="1600" dirty="0" err="1"/>
-              <a:t>Tap</a:t>
-            </a:r>
-            <a:r>
-              <a:rPr lang="de-DE" sz="1600" dirty="0"/>
-              <a:t> type</a:t>
-            </a:r>
-          </a:p>
-        </p:txBody>
-      </p:sp>
-      <p:sp>
-        <p:nvSpPr>
-          <p:cNvPr id="9" name="Ellipse 8">
-            <a:extLst>
-              <a:ext uri="{FF2B5EF4-FFF2-40B4-BE49-F238E27FC236}">
-                <a16:creationId xmlns:a16="http://schemas.microsoft.com/office/drawing/2014/main" id="{D3753840-58F4-4A8A-876F-08E7FF585157}"/>
-              </a:ext>
-            </a:extLst>
-          </p:cNvPr>
-          <p:cNvSpPr/>
-          <p:nvPr/>
-        </p:nvSpPr>
-        <p:spPr>
-          <a:xfrm>
-            <a:off x="4179138" y="2761934"/>
-            <a:ext cx="216024" cy="216000"/>
-          </a:xfrm>
-          <a:prstGeom prst="ellipse">
-            <a:avLst/>
-          </a:prstGeom>
-          <a:ln>
-            <a:solidFill>
-              <a:schemeClr val="accent3"/>
-            </a:solidFill>
-          </a:ln>
-        </p:spPr>
-        <p:style>
-          <a:lnRef idx="2">
-            <a:schemeClr val="accent3">
-              <a:shade val="50000"/>
-            </a:schemeClr>
-          </a:lnRef>
-          <a:fillRef idx="1">
-            <a:schemeClr val="accent3"/>
-          </a:fillRef>
-          <a:effectRef idx="0">
-            <a:schemeClr val="accent3"/>
-          </a:effectRef>
-          <a:fontRef idx="minor">
-            <a:schemeClr val="lt1"/>
-          </a:fontRef>
-        </p:style>
-        <p:txBody>
-          <a:bodyPr rtlCol="0" anchor="ctr"/>
-          <a:lstStyle/>
-          <a:p>
-            <a:pPr algn="ctr"/>
-            <a:endParaRPr lang="de-DE"/>
-          </a:p>
-        </p:txBody>
-      </p:sp>
-      <p:sp>
-        <p:nvSpPr>
-          <p:cNvPr id="10" name="Ellipse 9">
-            <a:extLst>
-              <a:ext uri="{FF2B5EF4-FFF2-40B4-BE49-F238E27FC236}">
-                <a16:creationId xmlns:a16="http://schemas.microsoft.com/office/drawing/2014/main" id="{14C3333B-C31F-4DF7-8170-59B3D0FBE07E}"/>
-              </a:ext>
-            </a:extLst>
-          </p:cNvPr>
-          <p:cNvSpPr/>
-          <p:nvPr/>
-        </p:nvSpPr>
-        <p:spPr>
-          <a:xfrm>
-            <a:off x="4431622" y="3873519"/>
-            <a:ext cx="216024" cy="216000"/>
-          </a:xfrm>
-          <a:prstGeom prst="ellipse">
-            <a:avLst/>
-          </a:prstGeom>
-          <a:ln>
-            <a:solidFill>
-              <a:schemeClr val="accent3"/>
-            </a:solidFill>
-          </a:ln>
-        </p:spPr>
-        <p:style>
-          <a:lnRef idx="2">
-            <a:schemeClr val="accent3">
-              <a:shade val="50000"/>
-            </a:schemeClr>
-          </a:lnRef>
-          <a:fillRef idx="1">
-            <a:schemeClr val="accent3"/>
-          </a:fillRef>
-          <a:effectRef idx="0">
-            <a:schemeClr val="accent3"/>
-          </a:effectRef>
-          <a:fontRef idx="minor">
-            <a:schemeClr val="lt1"/>
-          </a:fontRef>
-        </p:style>
-        <p:txBody>
-          <a:bodyPr rtlCol="0" anchor="ctr"/>
-          <a:lstStyle/>
-          <a:p>
-            <a:pPr algn="ctr"/>
-            <a:endParaRPr lang="de-DE"/>
-          </a:p>
-        </p:txBody>
-      </p:sp>
-      <p:sp>
-        <p:nvSpPr>
-          <p:cNvPr id="11" name="Ellipse 10">
-            <a:extLst>
-              <a:ext uri="{FF2B5EF4-FFF2-40B4-BE49-F238E27FC236}">
-                <a16:creationId xmlns:a16="http://schemas.microsoft.com/office/drawing/2014/main" id="{42D05882-2601-43D4-A3DB-7FA690493BF7}"/>
-              </a:ext>
-            </a:extLst>
-          </p:cNvPr>
-          <p:cNvSpPr/>
-          <p:nvPr/>
-        </p:nvSpPr>
-        <p:spPr>
-          <a:xfrm>
-            <a:off x="5010412" y="3135965"/>
-            <a:ext cx="216024" cy="216000"/>
-          </a:xfrm>
-          <a:prstGeom prst="ellipse">
-            <a:avLst/>
-          </a:prstGeom>
-          <a:ln>
-            <a:solidFill>
-              <a:schemeClr val="accent3"/>
-            </a:solidFill>
-          </a:ln>
-        </p:spPr>
-        <p:style>
-          <a:lnRef idx="2">
-            <a:schemeClr val="accent3">
-              <a:shade val="50000"/>
-            </a:schemeClr>
-          </a:lnRef>
-          <a:fillRef idx="1">
-            <a:schemeClr val="accent3"/>
-          </a:fillRef>
-          <a:effectRef idx="0">
-            <a:schemeClr val="accent3"/>
-          </a:effectRef>
-          <a:fontRef idx="minor">
-            <a:schemeClr val="lt1"/>
-          </a:fontRef>
-        </p:style>
-        <p:txBody>
-          <a:bodyPr rtlCol="0" anchor="ctr"/>
-          <a:lstStyle/>
-          <a:p>
-            <a:pPr algn="ctr"/>
-            <a:endParaRPr lang="de-DE"/>
+              <a:t>: Model </a:t>
+            </a:r>
+            <a:r>
+              <a:rPr lang="de-DE" dirty="0" err="1"/>
+              <a:t>training</a:t>
+            </a:r>
+            <a:endParaRPr lang="de-DE" dirty="0"/>
           </a:p>
         </p:txBody>
       </p:sp>
     </p:spTree>
     <p:extLst>
       <p:ext uri="{BB962C8B-B14F-4D97-AF65-F5344CB8AC3E}">
-        <p14:creationId xmlns:p14="http://schemas.microsoft.com/office/powerpoint/2010/main" val="4028138573"/>
+        <p14:creationId xmlns:p14="http://schemas.microsoft.com/office/powerpoint/2010/main" val="1517286234"/>
       </p:ext>
     </p:extLst>
   </p:cSld>
   <p:clrMapOvr>
     <a:masterClrMapping/>
   </p:clrMapOvr>
-  <p:timing>
-    <p:tnLst>
-      <p:par>
-        <p:cTn id="1" dur="indefinite" restart="never" nodeType="tmRoot">
-          <p:childTnLst>
-            <p:seq concurrent="1" nextAc="seek">
-              <p:cTn id="2" dur="indefinite" nodeType="mainSeq">
-                <p:childTnLst>
-                  <p:par>
-                    <p:cTn id="3" fill="hold">
-                      <p:stCondLst>
-                        <p:cond delay="indefinite"/>
-                      </p:stCondLst>
-                      <p:childTnLst>
-                        <p:par>
-                          <p:cTn id="4" fill="hold">
-                            <p:stCondLst>
-                              <p:cond delay="0"/>
-                            </p:stCondLst>
-                            <p:childTnLst>
-                              <p:par>
-                                <p:cTn id="5" presetID="1" presetClass="entr" presetSubtype="0" fill="hold" nodeType="clickEffect">
-                                  <p:stCondLst>
-                                    <p:cond delay="0"/>
-                                  </p:stCondLst>
-                                  <p:childTnLst>
-                                    <p:set>
-                                      <p:cBhvr>
-                                        <p:cTn id="6" dur="1" fill="hold">
-                                          <p:stCondLst>
-                                            <p:cond delay="0"/>
-                                          </p:stCondLst>
-                                        </p:cTn>
-                                        <p:tgtEl>
-                                          <p:spTgt spid="6"/>
-                                        </p:tgtEl>
-                                        <p:attrNameLst>
-                                          <p:attrName>style.visibility</p:attrName>
-                                        </p:attrNameLst>
-                                      </p:cBhvr>
-                                      <p:to>
-                                        <p:strVal val="visible"/>
-                                      </p:to>
-                                    </p:set>
-                                  </p:childTnLst>
-                                </p:cTn>
-                              </p:par>
-                            </p:childTnLst>
-                          </p:cTn>
-                        </p:par>
-                        <p:par>
-                          <p:cTn id="7" fill="hold">
-                            <p:stCondLst>
-                              <p:cond delay="0"/>
-                            </p:stCondLst>
-                            <p:childTnLst>
-                              <p:par>
-                                <p:cTn id="8" presetID="1" presetClass="entr" presetSubtype="0" fill="hold" grpId="0" nodeType="afterEffect">
-                                  <p:stCondLst>
-                                    <p:cond delay="0"/>
-                                  </p:stCondLst>
-                                  <p:childTnLst>
-                                    <p:set>
-                                      <p:cBhvr>
-                                        <p:cTn id="9" dur="1" fill="hold">
-                                          <p:stCondLst>
-                                            <p:cond delay="0"/>
-                                          </p:stCondLst>
-                                        </p:cTn>
-                                        <p:tgtEl>
-                                          <p:spTgt spid="7"/>
-                                        </p:tgtEl>
-                                        <p:attrNameLst>
-                                          <p:attrName>style.visibility</p:attrName>
-                                        </p:attrNameLst>
-                                      </p:cBhvr>
-                                      <p:to>
-                                        <p:strVal val="visible"/>
-                                      </p:to>
-                                    </p:set>
-                                  </p:childTnLst>
-                                </p:cTn>
-                              </p:par>
-                              <p:par>
-                                <p:cTn id="10" presetID="1" presetClass="entr" presetSubtype="0" fill="hold" grpId="0" nodeType="withEffect">
-                                  <p:stCondLst>
-                                    <p:cond delay="0"/>
-                                  </p:stCondLst>
-                                  <p:childTnLst>
-                                    <p:set>
-                                      <p:cBhvr>
-                                        <p:cTn id="11" dur="1" fill="hold">
-                                          <p:stCondLst>
-                                            <p:cond delay="0"/>
-                                          </p:stCondLst>
-                                        </p:cTn>
-                                        <p:tgtEl>
-                                          <p:spTgt spid="8"/>
-                                        </p:tgtEl>
-                                        <p:attrNameLst>
-                                          <p:attrName>style.visibility</p:attrName>
-                                        </p:attrNameLst>
-                                      </p:cBhvr>
-                                      <p:to>
-                                        <p:strVal val="visible"/>
-                                      </p:to>
-                                    </p:set>
-                                  </p:childTnLst>
-                                </p:cTn>
-                              </p:par>
-                            </p:childTnLst>
-                          </p:cTn>
-                        </p:par>
-                      </p:childTnLst>
-                    </p:cTn>
-                  </p:par>
-                  <p:par>
-                    <p:cTn id="12" fill="hold">
-                      <p:stCondLst>
-                        <p:cond delay="indefinite"/>
-                      </p:stCondLst>
-                      <p:childTnLst>
-                        <p:par>
-                          <p:cTn id="13" fill="hold">
-                            <p:stCondLst>
-                              <p:cond delay="0"/>
-                            </p:stCondLst>
-                            <p:childTnLst>
-                              <p:par>
-                                <p:cTn id="14" presetID="1" presetClass="entr" presetSubtype="0" fill="hold" grpId="0" nodeType="clickEffect">
-                                  <p:stCondLst>
-                                    <p:cond delay="500"/>
-                                  </p:stCondLst>
-                                  <p:childTnLst>
-                                    <p:set>
-                                      <p:cBhvr>
-                                        <p:cTn id="15" dur="1" fill="hold">
-                                          <p:stCondLst>
-                                            <p:cond delay="0"/>
-                                          </p:stCondLst>
-                                        </p:cTn>
-                                        <p:tgtEl>
-                                          <p:spTgt spid="9"/>
-                                        </p:tgtEl>
-                                        <p:attrNameLst>
-                                          <p:attrName>style.visibility</p:attrName>
-                                        </p:attrNameLst>
-                                      </p:cBhvr>
-                                      <p:to>
-                                        <p:strVal val="visible"/>
-                                      </p:to>
-                                    </p:set>
-                                  </p:childTnLst>
-                                </p:cTn>
-                              </p:par>
-                            </p:childTnLst>
-                          </p:cTn>
-                        </p:par>
-                        <p:par>
-                          <p:cTn id="16" fill="hold">
-                            <p:stCondLst>
-                              <p:cond delay="500"/>
-                            </p:stCondLst>
-                            <p:childTnLst>
-                              <p:par>
-                                <p:cTn id="17" presetID="1" presetClass="exit" presetSubtype="0" fill="hold" grpId="1" nodeType="afterEffect">
-                                  <p:stCondLst>
-                                    <p:cond delay="0"/>
-                                  </p:stCondLst>
-                                  <p:childTnLst>
-                                    <p:set>
-                                      <p:cBhvr>
-                                        <p:cTn id="18" dur="1" fill="hold">
-                                          <p:stCondLst>
-                                            <p:cond delay="0"/>
-                                          </p:stCondLst>
-                                        </p:cTn>
-                                        <p:tgtEl>
-                                          <p:spTgt spid="9"/>
-                                        </p:tgtEl>
-                                        <p:attrNameLst>
-                                          <p:attrName>style.visibility</p:attrName>
-                                        </p:attrNameLst>
-                                      </p:cBhvr>
-                                      <p:to>
-                                        <p:strVal val="hidden"/>
-                                      </p:to>
-                                    </p:set>
-                                  </p:childTnLst>
-                                </p:cTn>
-                              </p:par>
-                              <p:par>
-                                <p:cTn id="19" presetID="1" presetClass="entr" presetSubtype="0" fill="hold" grpId="0" nodeType="withEffect">
-                                  <p:stCondLst>
-                                    <p:cond delay="0"/>
-                                  </p:stCondLst>
-                                  <p:childTnLst>
-                                    <p:set>
-                                      <p:cBhvr>
-                                        <p:cTn id="20" dur="1" fill="hold">
-                                          <p:stCondLst>
-                                            <p:cond delay="0"/>
-                                          </p:stCondLst>
-                                        </p:cTn>
-                                        <p:tgtEl>
-                                          <p:spTgt spid="10"/>
-                                        </p:tgtEl>
-                                        <p:attrNameLst>
-                                          <p:attrName>style.visibility</p:attrName>
-                                        </p:attrNameLst>
-                                      </p:cBhvr>
-                                      <p:to>
-                                        <p:strVal val="visible"/>
-                                      </p:to>
-                                    </p:set>
-                                  </p:childTnLst>
-                                </p:cTn>
-                              </p:par>
-                            </p:childTnLst>
-                          </p:cTn>
-                        </p:par>
-                      </p:childTnLst>
-                    </p:cTn>
-                  </p:par>
-                  <p:par>
-                    <p:cTn id="21" fill="hold">
-                      <p:stCondLst>
-                        <p:cond delay="indefinite"/>
-                      </p:stCondLst>
-                      <p:childTnLst>
-                        <p:par>
-                          <p:cTn id="22" fill="hold">
-                            <p:stCondLst>
-                              <p:cond delay="0"/>
-                            </p:stCondLst>
-                            <p:childTnLst>
-                              <p:par>
-                                <p:cTn id="23" presetID="1" presetClass="exit" presetSubtype="0" fill="hold" grpId="1" nodeType="clickEffect">
-                                  <p:stCondLst>
-                                    <p:cond delay="0"/>
-                                  </p:stCondLst>
-                                  <p:childTnLst>
-                                    <p:set>
-                                      <p:cBhvr>
-                                        <p:cTn id="24" dur="1" fill="hold">
-                                          <p:stCondLst>
-                                            <p:cond delay="0"/>
-                                          </p:stCondLst>
-                                        </p:cTn>
-                                        <p:tgtEl>
-                                          <p:spTgt spid="10"/>
-                                        </p:tgtEl>
-                                        <p:attrNameLst>
-                                          <p:attrName>style.visibility</p:attrName>
-                                        </p:attrNameLst>
-                                      </p:cBhvr>
-                                      <p:to>
-                                        <p:strVal val="hidden"/>
-                                      </p:to>
-                                    </p:set>
-                                  </p:childTnLst>
-                                </p:cTn>
-                              </p:par>
-                              <p:par>
-                                <p:cTn id="25" presetID="1" presetClass="entr" presetSubtype="0" fill="hold" grpId="0" nodeType="withEffect">
-                                  <p:stCondLst>
-                                    <p:cond delay="0"/>
-                                  </p:stCondLst>
-                                  <p:childTnLst>
-                                    <p:set>
-                                      <p:cBhvr>
-                                        <p:cTn id="26" dur="1" fill="hold">
-                                          <p:stCondLst>
-                                            <p:cond delay="0"/>
-                                          </p:stCondLst>
-                                        </p:cTn>
-                                        <p:tgtEl>
-                                          <p:spTgt spid="11"/>
-                                        </p:tgtEl>
-                                        <p:attrNameLst>
-                                          <p:attrName>style.visibility</p:attrName>
-                                        </p:attrNameLst>
-                                      </p:cBhvr>
-                                      <p:to>
-                                        <p:strVal val="visible"/>
-                                      </p:to>
-                                    </p:set>
-                                  </p:childTnLst>
-                                </p:cTn>
-                              </p:par>
-                            </p:childTnLst>
-                          </p:cTn>
-                        </p:par>
-                      </p:childTnLst>
-                    </p:cTn>
-                  </p:par>
-                  <p:par>
-                    <p:cTn id="27" fill="hold">
-                      <p:stCondLst>
-                        <p:cond delay="indefinite"/>
-                      </p:stCondLst>
-                      <p:childTnLst>
-                        <p:par>
-                          <p:cTn id="28" fill="hold">
-                            <p:stCondLst>
-                              <p:cond delay="0"/>
-                            </p:stCondLst>
-                            <p:childTnLst>
-                              <p:par>
-                                <p:cTn id="29" presetID="1" presetClass="entr" presetSubtype="0" fill="hold" nodeType="clickEffect">
-                                  <p:stCondLst>
-                                    <p:cond delay="0"/>
-                                  </p:stCondLst>
-                                  <p:childTnLst>
-                                    <p:set>
-                                      <p:cBhvr>
-                                        <p:cTn id="30" dur="1" fill="hold">
-                                          <p:stCondLst>
-                                            <p:cond delay="0"/>
-                                          </p:stCondLst>
-                                        </p:cTn>
-                                        <p:tgtEl>
-                                          <p:spTgt spid="5"/>
-                                        </p:tgtEl>
-                                        <p:attrNameLst>
-                                          <p:attrName>style.visibility</p:attrName>
-                                        </p:attrNameLst>
-                                      </p:cBhvr>
-                                      <p:to>
-                                        <p:strVal val="visible"/>
-                                      </p:to>
-                                    </p:set>
-                                  </p:childTnLst>
-                                </p:cTn>
-                              </p:par>
-                            </p:childTnLst>
-                          </p:cTn>
-                        </p:par>
-                      </p:childTnLst>
-                    </p:cTn>
-                  </p:par>
-                </p:childTnLst>
-              </p:cTn>
-              <p:prevCondLst>
-                <p:cond evt="onPrev" delay="0">
-                  <p:tgtEl>
-                    <p:sldTgt/>
-                  </p:tgtEl>
-                </p:cond>
-              </p:prevCondLst>
-              <p:nextCondLst>
-                <p:cond evt="onNext" delay="0">
-                  <p:tgtEl>
-                    <p:sldTgt/>
-                  </p:tgtEl>
-                </p:cond>
-              </p:nextCondLst>
-            </p:seq>
-          </p:childTnLst>
-        </p:cTn>
-      </p:par>
-    </p:tnLst>
-    <p:bldLst>
-      <p:bldP spid="7" grpId="0"/>
-      <p:bldP spid="8" grpId="0"/>
-      <p:bldP spid="9" grpId="0" animBg="1"/>
-      <p:bldP spid="9" grpId="1" animBg="1"/>
-      <p:bldP spid="10" grpId="0" animBg="1"/>
-      <p:bldP spid="10" grpId="1" animBg="1"/>
-      <p:bldP spid="11" grpId="0" animBg="1"/>
-    </p:bldLst>
-  </p:timing>
 </p:sld>
 </file>
 
@@ -7253,7 +5748,7 @@
           <p:cNvPr id="2" name="Inhaltsplatzhalter 1">
             <a:extLst>
               <a:ext uri="{FF2B5EF4-FFF2-40B4-BE49-F238E27FC236}">
-                <a16:creationId xmlns:a16="http://schemas.microsoft.com/office/drawing/2014/main" id="{1E1C0051-724B-411C-BDD1-215A1E1A54D7}"/>
+                <a16:creationId xmlns:a16="http://schemas.microsoft.com/office/drawing/2014/main" id="{719F1C91-4689-4DC8-AD81-6F1E4DCC533C}"/>
               </a:ext>
             </a:extLst>
           </p:cNvPr>
@@ -7270,24 +5765,26 @@
           <a:lstStyle/>
           <a:p>
             <a:r>
-              <a:rPr lang="de-DE" dirty="0" err="1"/>
-              <a:t>Only</a:t>
-            </a:r>
-            <a:r>
-              <a:rPr lang="de-DE" dirty="0"/>
-              <a:t> Right-</a:t>
-            </a:r>
-            <a:r>
-              <a:rPr lang="de-DE" dirty="0" err="1"/>
-              <a:t>handed</a:t>
-            </a:r>
-            <a:r>
-              <a:rPr lang="de-DE" dirty="0"/>
-              <a:t>, not </a:t>
-            </a:r>
-            <a:r>
-              <a:rPr lang="de-DE" dirty="0" err="1"/>
-              <a:t>movement</a:t>
+              <a:rPr lang="de-DE" dirty="0"/>
+              <a:t>App </a:t>
+            </a:r>
+            <a:r>
+              <a:rPr lang="de-DE" dirty="0" err="1"/>
+              <a:t>until</a:t>
+            </a:r>
+            <a:r>
+              <a:rPr lang="de-DE" dirty="0"/>
+              <a:t> 9.12</a:t>
+            </a:r>
+          </a:p>
+          <a:p>
+            <a:r>
+              <a:rPr lang="de-DE" dirty="0"/>
+              <a:t>Study </a:t>
+            </a:r>
+            <a:r>
+              <a:rPr lang="de-DE" dirty="0" err="1"/>
+              <a:t>done</a:t>
             </a:r>
             <a:r>
               <a:rPr lang="de-DE" dirty="0"/>
@@ -7295,14 +5792,17 @@
             </a:r>
             <a:r>
               <a:rPr lang="de-DE" dirty="0" err="1"/>
-              <a:t>impaired</a:t>
-            </a:r>
-            <a:endParaRPr lang="de-DE" dirty="0"/>
-          </a:p>
-          <a:p>
-            <a:r>
-              <a:rPr lang="de-DE" dirty="0" err="1"/>
-              <a:t>Two-handed</a:t>
+              <a:t>until</a:t>
+            </a:r>
+            <a:r>
+              <a:rPr lang="de-DE" dirty="0"/>
+              <a:t> 21.12</a:t>
+            </a:r>
+          </a:p>
+          <a:p>
+            <a:r>
+              <a:rPr lang="de-DE" dirty="0" err="1"/>
+              <a:t>Results</a:t>
             </a:r>
             <a:r>
               <a:rPr lang="de-DE" dirty="0"/>
@@ -7310,7 +5810,15 @@
             </a:r>
             <a:r>
               <a:rPr lang="de-DE" dirty="0" err="1"/>
-              <a:t>interaction</a:t>
+              <a:t>until</a:t>
+            </a:r>
+            <a:r>
+              <a:rPr lang="de-DE" dirty="0"/>
+              <a:t> end </a:t>
+            </a:r>
+            <a:r>
+              <a:rPr lang="de-DE" dirty="0" err="1"/>
+              <a:t>of</a:t>
             </a:r>
             <a:r>
               <a:rPr lang="de-DE" dirty="0"/>
@@ -7318,18 +5826,14 @@
             </a:r>
             <a:r>
               <a:rPr lang="de-DE" dirty="0" err="1"/>
-              <a:t>only</a:t>
-            </a:r>
-            <a:endParaRPr lang="de-DE" dirty="0"/>
-          </a:p>
-          <a:p>
-            <a:r>
-              <a:rPr lang="de-DE" dirty="0"/>
-              <a:t>100 </a:t>
-            </a:r>
-            <a:r>
-              <a:rPr lang="de-DE" dirty="0" err="1"/>
-              <a:t>target</a:t>
+              <a:t>january</a:t>
+            </a:r>
+            <a:endParaRPr lang="de-DE" dirty="0"/>
+          </a:p>
+          <a:p>
+            <a:r>
+              <a:rPr lang="de-DE" dirty="0" err="1"/>
+              <a:t>Camera</a:t>
             </a:r>
             <a:r>
               <a:rPr lang="de-DE" dirty="0"/>
@@ -7337,70 +5841,43 @@
             </a:r>
             <a:r>
               <a:rPr lang="de-DE" dirty="0" err="1"/>
-              <a:t>selection</a:t>
-            </a:r>
-            <a:r>
-              <a:rPr lang="de-DE" dirty="0"/>
-              <a:t> per </a:t>
-            </a:r>
-            <a:r>
-              <a:rPr lang="de-DE" dirty="0" err="1"/>
-              <a:t>condition</a:t>
-            </a:r>
-            <a:r>
-              <a:rPr lang="de-DE" dirty="0"/>
-              <a:t> (6 </a:t>
-            </a:r>
-            <a:r>
-              <a:rPr lang="de-DE" dirty="0" err="1"/>
-              <a:t>conditions</a:t>
-            </a:r>
-            <a:r>
-              <a:rPr lang="de-DE" dirty="0"/>
-              <a:t>)</a:t>
-            </a:r>
-          </a:p>
-          <a:p>
-            <a:r>
-              <a:rPr lang="de-DE" dirty="0" err="1"/>
-              <a:t>Within-Subject</a:t>
-            </a:r>
-            <a:r>
-              <a:rPr lang="de-DE" dirty="0"/>
-              <a:t> design</a:t>
-            </a:r>
-          </a:p>
-          <a:p>
-            <a:r>
-              <a:rPr lang="de-DE" dirty="0"/>
-              <a:t>~16 </a:t>
-            </a:r>
-            <a:r>
-              <a:rPr lang="de-DE" dirty="0" err="1"/>
-              <a:t>participants</a:t>
+              <a:t>ready</a:t>
             </a:r>
             <a:r>
               <a:rPr lang="de-DE" dirty="0"/>
               <a:t> </a:t>
             </a:r>
-          </a:p>
-          <a:p>
-            <a:r>
-              <a:rPr lang="de-DE" dirty="0"/>
-              <a:t>Study-</a:t>
-            </a:r>
-            <a:r>
-              <a:rPr lang="de-DE" dirty="0" err="1"/>
-              <a:t>length</a:t>
-            </a:r>
-            <a:r>
-              <a:rPr lang="de-DE" dirty="0"/>
-              <a:t>: 15 </a:t>
-            </a:r>
-            <a:r>
-              <a:rPr lang="de-DE" dirty="0" err="1"/>
-              <a:t>minutes</a:t>
-            </a:r>
+            <a:r>
+              <a:rPr lang="de-DE" dirty="0" err="1"/>
+              <a:t>paper</a:t>
+            </a:r>
+            <a:r>
+              <a:rPr lang="de-DE" dirty="0"/>
+              <a:t> </a:t>
+            </a:r>
+            <a:r>
+              <a:rPr lang="de-DE" dirty="0" err="1"/>
+              <a:t>until</a:t>
+            </a:r>
+            <a:r>
+              <a:rPr lang="de-DE" dirty="0"/>
+              <a:t> </a:t>
+            </a:r>
+            <a:r>
+              <a:rPr lang="de-DE" dirty="0" err="1"/>
+              <a:t>mid</a:t>
+            </a:r>
+            <a:r>
+              <a:rPr lang="de-DE" dirty="0"/>
+              <a:t> </a:t>
+            </a:r>
+            <a:r>
+              <a:rPr lang="de-DE" dirty="0" err="1"/>
+              <a:t>february</a:t>
+            </a:r>
+            <a:endParaRPr lang="de-DE" dirty="0"/>
+          </a:p>
+          <a:p>
             <a:endParaRPr lang="de-DE" dirty="0"/>
           </a:p>
           <a:p>
@@ -7419,7 +5896,7 @@
           <p:cNvPr id="3" name="Foliennummernplatzhalter 2">
             <a:extLst>
               <a:ext uri="{FF2B5EF4-FFF2-40B4-BE49-F238E27FC236}">
-                <a16:creationId xmlns:a16="http://schemas.microsoft.com/office/drawing/2014/main" id="{8C0FD180-B4A3-4327-9EDE-F359930B83B7}"/>
+                <a16:creationId xmlns:a16="http://schemas.microsoft.com/office/drawing/2014/main" id="{59C2DE10-8D0E-4834-9FE4-C5D704BF65DA}"/>
               </a:ext>
             </a:extLst>
           </p:cNvPr>
@@ -7448,7 +5925,7 @@
           <p:cNvPr id="4" name="Titel 3">
             <a:extLst>
               <a:ext uri="{FF2B5EF4-FFF2-40B4-BE49-F238E27FC236}">
-                <a16:creationId xmlns:a16="http://schemas.microsoft.com/office/drawing/2014/main" id="{BFB8DF1B-1D49-452C-9A29-879B3BB3D291}"/>
+                <a16:creationId xmlns:a16="http://schemas.microsoft.com/office/drawing/2014/main" id="{52E21FE3-62D2-416F-A8C1-4F273C3B927C}"/>
               </a:ext>
             </a:extLst>
           </p:cNvPr>
@@ -7466,15 +5943,7 @@
           <a:p>
             <a:r>
               <a:rPr lang="de-DE" dirty="0"/>
-              <a:t>Project </a:t>
-            </a:r>
-            <a:r>
-              <a:rPr lang="de-DE" dirty="0" err="1"/>
-              <a:t>planning</a:t>
-            </a:r>
-            <a:r>
-              <a:rPr lang="de-DE" dirty="0"/>
-              <a:t>: Study</a:t>
+              <a:t>Agenda</a:t>
             </a:r>
           </a:p>
         </p:txBody>
@@ -7482,7 +5951,7 @@
     </p:spTree>
     <p:extLst>
       <p:ext uri="{BB962C8B-B14F-4D97-AF65-F5344CB8AC3E}">
-        <p14:creationId xmlns:p14="http://schemas.microsoft.com/office/powerpoint/2010/main" val="3080695642"/>
+        <p14:creationId xmlns:p14="http://schemas.microsoft.com/office/powerpoint/2010/main" val="1059873877"/>
       </p:ext>
     </p:extLst>
   </p:cSld>

</xml_diff>